<commit_message>
update the slides and add the code details
</commit_message>
<xml_diff>
--- a/original-source-file/HTMLCSS--updated.pptx
+++ b/original-source-file/HTMLCSS--updated.pptx
@@ -5,7 +5,7 @@
     <p:sldMasterId id="2147483660" r:id="rId1"/>
   </p:sldMasterIdLst>
   <p:notesMasterIdLst>
-    <p:notesMasterId r:id="rId41"/>
+    <p:notesMasterId r:id="rId44"/>
   </p:notesMasterIdLst>
   <p:sldIdLst>
     <p:sldId id="284" r:id="rId2"/>
@@ -45,8 +45,11 @@
     <p:sldId id="318" r:id="rId36"/>
     <p:sldId id="319" r:id="rId37"/>
     <p:sldId id="320" r:id="rId38"/>
-    <p:sldId id="321" r:id="rId39"/>
-    <p:sldId id="322" r:id="rId40"/>
+    <p:sldId id="323" r:id="rId39"/>
+    <p:sldId id="321" r:id="rId40"/>
+    <p:sldId id="322" r:id="rId41"/>
+    <p:sldId id="325" r:id="rId42"/>
+    <p:sldId id="324" r:id="rId43"/>
   </p:sldIdLst>
   <p:sldSz cx="12192000" cy="6858000"/>
   <p:notesSz cx="6858000" cy="9144000"/>
@@ -156,7 +159,7 @@
 <file path=ppt/revisionInfo.xml><?xml version="1.0" encoding="utf-8"?>
 <p1510:revInfo xmlns:a="http://schemas.openxmlformats.org/drawingml/2006/main" xmlns:r="http://schemas.openxmlformats.org/officeDocument/2006/relationships" xmlns:p1510="http://schemas.microsoft.com/office/powerpoint/2015/10/main">
   <p1510:revLst>
-    <p1510:client id="{1355135F-AA6A-4FE7-B5A3-AB52DE92266F}" v="25" dt="2026-02-01T17:18:27.247"/>
+    <p1510:client id="{1355135F-AA6A-4FE7-B5A3-AB52DE92266F}" v="37" dt="2026-02-01T20:13:42.030"/>
   </p1510:revLst>
 </p1510:revInfo>
 </file>
@@ -165,8 +168,8 @@
 <pc:chgInfo xmlns:a="http://schemas.openxmlformats.org/drawingml/2006/main" xmlns:r="http://schemas.openxmlformats.org/officeDocument/2006/relationships" xmlns:ac="http://schemas.microsoft.com/office/drawing/2013/main/command" xmlns:pc="http://schemas.microsoft.com/office/powerpoint/2013/main/command">
   <pc:docChgLst>
     <pc:chgData name="Mahmood, Hafiz" userId="18238e4e-7e2b-4e05-bbf7-86d51a419a23" providerId="ADAL" clId="{BF66D714-9115-4DD6-B634-E048A95B02B0}"/>
-    <pc:docChg chg="undo custSel addSld modSld">
-      <pc:chgData name="Mahmood, Hafiz" userId="18238e4e-7e2b-4e05-bbf7-86d51a419a23" providerId="ADAL" clId="{BF66D714-9115-4DD6-B634-E048A95B02B0}" dt="2026-02-01T17:18:27.247" v="156"/>
+    <pc:docChg chg="undo custSel addSld modSld sldOrd">
+      <pc:chgData name="Mahmood, Hafiz" userId="18238e4e-7e2b-4e05-bbf7-86d51a419a23" providerId="ADAL" clId="{BF66D714-9115-4DD6-B634-E048A95B02B0}" dt="2026-02-01T20:18:44.033" v="338" actId="20577"/>
       <pc:docMkLst>
         <pc:docMk/>
       </pc:docMkLst>
@@ -209,13 +212,13 @@
         </pc:spChg>
       </pc:sldChg>
       <pc:sldChg chg="addSp modSp add mod">
-        <pc:chgData name="Mahmood, Hafiz" userId="18238e4e-7e2b-4e05-bbf7-86d51a419a23" providerId="ADAL" clId="{BF66D714-9115-4DD6-B634-E048A95B02B0}" dt="2026-02-01T17:07:03.671" v="75" actId="20577"/>
+        <pc:chgData name="Mahmood, Hafiz" userId="18238e4e-7e2b-4e05-bbf7-86d51a419a23" providerId="ADAL" clId="{BF66D714-9115-4DD6-B634-E048A95B02B0}" dt="2026-02-01T20:04:00.270" v="230" actId="14100"/>
         <pc:sldMkLst>
           <pc:docMk/>
           <pc:sldMk cId="2959389765" sldId="317"/>
         </pc:sldMkLst>
         <pc:spChg chg="mod">
-          <ac:chgData name="Mahmood, Hafiz" userId="18238e4e-7e2b-4e05-bbf7-86d51a419a23" providerId="ADAL" clId="{BF66D714-9115-4DD6-B634-E048A95B02B0}" dt="2026-02-01T17:07:03.671" v="75" actId="20577"/>
+          <ac:chgData name="Mahmood, Hafiz" userId="18238e4e-7e2b-4e05-bbf7-86d51a419a23" providerId="ADAL" clId="{BF66D714-9115-4DD6-B634-E048A95B02B0}" dt="2026-02-01T20:01:40.214" v="226" actId="20577"/>
           <ac:spMkLst>
             <pc:docMk/>
             <pc:sldMk cId="2959389765" sldId="317"/>
@@ -230,15 +233,23 @@
             <ac:spMk id="4" creationId="{29051BF0-9B1D-8A00-2C3D-6DD895D7D9E5}"/>
           </ac:spMkLst>
         </pc:spChg>
+        <pc:picChg chg="add mod">
+          <ac:chgData name="Mahmood, Hafiz" userId="18238e4e-7e2b-4e05-bbf7-86d51a419a23" providerId="ADAL" clId="{BF66D714-9115-4DD6-B634-E048A95B02B0}" dt="2026-02-01T20:04:00.270" v="230" actId="14100"/>
+          <ac:picMkLst>
+            <pc:docMk/>
+            <pc:sldMk cId="2959389765" sldId="317"/>
+            <ac:picMk id="5" creationId="{A2F2FD5C-4EEA-66E2-CC62-FC7C5B47753D}"/>
+          </ac:picMkLst>
+        </pc:picChg>
       </pc:sldChg>
-      <pc:sldChg chg="modSp add mod">
-        <pc:chgData name="Mahmood, Hafiz" userId="18238e4e-7e2b-4e05-bbf7-86d51a419a23" providerId="ADAL" clId="{BF66D714-9115-4DD6-B634-E048A95B02B0}" dt="2026-02-01T17:11:47.990" v="95" actId="12"/>
+      <pc:sldChg chg="addSp modSp add mod">
+        <pc:chgData name="Mahmood, Hafiz" userId="18238e4e-7e2b-4e05-bbf7-86d51a419a23" providerId="ADAL" clId="{BF66D714-9115-4DD6-B634-E048A95B02B0}" dt="2026-02-01T20:17:54.597" v="335" actId="20577"/>
         <pc:sldMkLst>
           <pc:docMk/>
           <pc:sldMk cId="3501361424" sldId="318"/>
         </pc:sldMkLst>
         <pc:spChg chg="mod">
-          <ac:chgData name="Mahmood, Hafiz" userId="18238e4e-7e2b-4e05-bbf7-86d51a419a23" providerId="ADAL" clId="{BF66D714-9115-4DD6-B634-E048A95B02B0}" dt="2026-02-01T17:11:10.960" v="79"/>
+          <ac:chgData name="Mahmood, Hafiz" userId="18238e4e-7e2b-4e05-bbf7-86d51a419a23" providerId="ADAL" clId="{BF66D714-9115-4DD6-B634-E048A95B02B0}" dt="2026-02-01T20:17:54.597" v="335" actId="20577"/>
           <ac:spMkLst>
             <pc:docMk/>
             <pc:sldMk cId="3501361424" sldId="318"/>
@@ -246,52 +257,100 @@
           </ac:spMkLst>
         </pc:spChg>
         <pc:spChg chg="mod">
-          <ac:chgData name="Mahmood, Hafiz" userId="18238e4e-7e2b-4e05-bbf7-86d51a419a23" providerId="ADAL" clId="{BF66D714-9115-4DD6-B634-E048A95B02B0}" dt="2026-02-01T17:11:47.990" v="95" actId="12"/>
+          <ac:chgData name="Mahmood, Hafiz" userId="18238e4e-7e2b-4e05-bbf7-86d51a419a23" providerId="ADAL" clId="{BF66D714-9115-4DD6-B634-E048A95B02B0}" dt="2026-02-01T20:17:40.469" v="333" actId="313"/>
           <ac:spMkLst>
             <pc:docMk/>
             <pc:sldMk cId="3501361424" sldId="318"/>
             <ac:spMk id="3" creationId="{D78C4C23-64D7-C205-C57A-E31154902F1B}"/>
           </ac:spMkLst>
         </pc:spChg>
+        <pc:picChg chg="add mod">
+          <ac:chgData name="Mahmood, Hafiz" userId="18238e4e-7e2b-4e05-bbf7-86d51a419a23" providerId="ADAL" clId="{BF66D714-9115-4DD6-B634-E048A95B02B0}" dt="2026-02-01T20:00:21.751" v="222" actId="14100"/>
+          <ac:picMkLst>
+            <pc:docMk/>
+            <pc:sldMk cId="3501361424" sldId="318"/>
+            <ac:picMk id="5" creationId="{A42B4A7B-7F81-18EA-0E06-9344963657C1}"/>
+          </ac:picMkLst>
+        </pc:picChg>
       </pc:sldChg>
-      <pc:sldChg chg="modSp add mod">
-        <pc:chgData name="Mahmood, Hafiz" userId="18238e4e-7e2b-4e05-bbf7-86d51a419a23" providerId="ADAL" clId="{BF66D714-9115-4DD6-B634-E048A95B02B0}" dt="2026-02-01T17:12:32.440" v="100" actId="12"/>
+      <pc:sldChg chg="addSp modSp add mod">
+        <pc:chgData name="Mahmood, Hafiz" userId="18238e4e-7e2b-4e05-bbf7-86d51a419a23" providerId="ADAL" clId="{BF66D714-9115-4DD6-B634-E048A95B02B0}" dt="2026-02-01T20:05:05.975" v="238" actId="20577"/>
         <pc:sldMkLst>
           <pc:docMk/>
           <pc:sldMk cId="1355137874" sldId="319"/>
         </pc:sldMkLst>
         <pc:spChg chg="mod">
-          <ac:chgData name="Mahmood, Hafiz" userId="18238e4e-7e2b-4e05-bbf7-86d51a419a23" providerId="ADAL" clId="{BF66D714-9115-4DD6-B634-E048A95B02B0}" dt="2026-02-01T17:12:32.440" v="100" actId="12"/>
+          <ac:chgData name="Mahmood, Hafiz" userId="18238e4e-7e2b-4e05-bbf7-86d51a419a23" providerId="ADAL" clId="{BF66D714-9115-4DD6-B634-E048A95B02B0}" dt="2026-02-01T20:05:05.975" v="238" actId="20577"/>
+          <ac:spMkLst>
+            <pc:docMk/>
+            <pc:sldMk cId="1355137874" sldId="319"/>
+            <ac:spMk id="2" creationId="{09C14A62-DA85-425A-0579-F61FCD5E1011}"/>
+          </ac:spMkLst>
+        </pc:spChg>
+        <pc:spChg chg="mod">
+          <ac:chgData name="Mahmood, Hafiz" userId="18238e4e-7e2b-4e05-bbf7-86d51a419a23" providerId="ADAL" clId="{BF66D714-9115-4DD6-B634-E048A95B02B0}" dt="2026-02-01T19:58:31.370" v="209" actId="20577"/>
           <ac:spMkLst>
             <pc:docMk/>
             <pc:sldMk cId="1355137874" sldId="319"/>
             <ac:spMk id="3" creationId="{FE82A38A-DCB2-84AB-B137-B0E37173DE01}"/>
           </ac:spMkLst>
         </pc:spChg>
+        <pc:picChg chg="add mod">
+          <ac:chgData name="Mahmood, Hafiz" userId="18238e4e-7e2b-4e05-bbf7-86d51a419a23" providerId="ADAL" clId="{BF66D714-9115-4DD6-B634-E048A95B02B0}" dt="2026-02-01T19:58:59.261" v="213" actId="14100"/>
+          <ac:picMkLst>
+            <pc:docMk/>
+            <pc:sldMk cId="1355137874" sldId="319"/>
+            <ac:picMk id="5" creationId="{B39CE892-0D99-722B-67CF-9ADEEB8A7E73}"/>
+          </ac:picMkLst>
+        </pc:picChg>
       </pc:sldChg>
-      <pc:sldChg chg="modSp add mod">
-        <pc:chgData name="Mahmood, Hafiz" userId="18238e4e-7e2b-4e05-bbf7-86d51a419a23" providerId="ADAL" clId="{BF66D714-9115-4DD6-B634-E048A95B02B0}" dt="2026-02-01T17:13:07.208" v="113" actId="12"/>
+      <pc:sldChg chg="addSp modSp add mod">
+        <pc:chgData name="Mahmood, Hafiz" userId="18238e4e-7e2b-4e05-bbf7-86d51a419a23" providerId="ADAL" clId="{BF66D714-9115-4DD6-B634-E048A95B02B0}" dt="2026-02-01T20:05:28.710" v="243" actId="20577"/>
         <pc:sldMkLst>
           <pc:docMk/>
           <pc:sldMk cId="1458757690" sldId="320"/>
         </pc:sldMkLst>
         <pc:spChg chg="mod">
-          <ac:chgData name="Mahmood, Hafiz" userId="18238e4e-7e2b-4e05-bbf7-86d51a419a23" providerId="ADAL" clId="{BF66D714-9115-4DD6-B634-E048A95B02B0}" dt="2026-02-01T17:13:07.208" v="113" actId="12"/>
+          <ac:chgData name="Mahmood, Hafiz" userId="18238e4e-7e2b-4e05-bbf7-86d51a419a23" providerId="ADAL" clId="{BF66D714-9115-4DD6-B634-E048A95B02B0}" dt="2026-02-01T20:05:28.710" v="243" actId="20577"/>
+          <ac:spMkLst>
+            <pc:docMk/>
+            <pc:sldMk cId="1458757690" sldId="320"/>
+            <ac:spMk id="2" creationId="{BE7D0511-3BD1-19C2-3E78-C70EF1247D79}"/>
+          </ac:spMkLst>
+        </pc:spChg>
+        <pc:spChg chg="mod">
+          <ac:chgData name="Mahmood, Hafiz" userId="18238e4e-7e2b-4e05-bbf7-86d51a419a23" providerId="ADAL" clId="{BF66D714-9115-4DD6-B634-E048A95B02B0}" dt="2026-02-01T19:56:50.707" v="193" actId="20577"/>
           <ac:spMkLst>
             <pc:docMk/>
             <pc:sldMk cId="1458757690" sldId="320"/>
             <ac:spMk id="3" creationId="{E49ED704-F07C-7B7E-62FD-562AB3D2C2DC}"/>
           </ac:spMkLst>
         </pc:spChg>
+        <pc:picChg chg="add mod">
+          <ac:chgData name="Mahmood, Hafiz" userId="18238e4e-7e2b-4e05-bbf7-86d51a419a23" providerId="ADAL" clId="{BF66D714-9115-4DD6-B634-E048A95B02B0}" dt="2026-02-01T19:56:57.454" v="197" actId="14100"/>
+          <ac:picMkLst>
+            <pc:docMk/>
+            <pc:sldMk cId="1458757690" sldId="320"/>
+            <ac:picMk id="5" creationId="{E15EC405-842D-A776-C637-AB1F166A6CD0}"/>
+          </ac:picMkLst>
+        </pc:picChg>
+        <pc:picChg chg="add mod">
+          <ac:chgData name="Mahmood, Hafiz" userId="18238e4e-7e2b-4e05-bbf7-86d51a419a23" providerId="ADAL" clId="{BF66D714-9115-4DD6-B634-E048A95B02B0}" dt="2026-02-01T19:57:37.977" v="207" actId="1076"/>
+          <ac:picMkLst>
+            <pc:docMk/>
+            <pc:sldMk cId="1458757690" sldId="320"/>
+            <ac:picMk id="7" creationId="{74E1CAAA-EF8F-63AA-80DA-4ECA7884E4A8}"/>
+          </ac:picMkLst>
+        </pc:picChg>
       </pc:sldChg>
       <pc:sldChg chg="addSp modSp add mod">
-        <pc:chgData name="Mahmood, Hafiz" userId="18238e4e-7e2b-4e05-bbf7-86d51a419a23" providerId="ADAL" clId="{BF66D714-9115-4DD6-B634-E048A95B02B0}" dt="2026-02-01T17:15:33.145" v="138" actId="20577"/>
+        <pc:chgData name="Mahmood, Hafiz" userId="18238e4e-7e2b-4e05-bbf7-86d51a419a23" providerId="ADAL" clId="{BF66D714-9115-4DD6-B634-E048A95B02B0}" dt="2026-02-01T19:53:22.777" v="180" actId="14100"/>
         <pc:sldMkLst>
           <pc:docMk/>
           <pc:sldMk cId="669017111" sldId="321"/>
         </pc:sldMkLst>
         <pc:spChg chg="mod">
-          <ac:chgData name="Mahmood, Hafiz" userId="18238e4e-7e2b-4e05-bbf7-86d51a419a23" providerId="ADAL" clId="{BF66D714-9115-4DD6-B634-E048A95B02B0}" dt="2026-02-01T17:14:04.419" v="122"/>
+          <ac:chgData name="Mahmood, Hafiz" userId="18238e4e-7e2b-4e05-bbf7-86d51a419a23" providerId="ADAL" clId="{BF66D714-9115-4DD6-B634-E048A95B02B0}" dt="2026-02-01T19:50:59.043" v="166" actId="20577"/>
           <ac:spMkLst>
             <pc:docMk/>
             <pc:sldMk cId="669017111" sldId="321"/>
@@ -307,22 +366,30 @@
           </ac:spMkLst>
         </pc:spChg>
         <pc:spChg chg="add mod">
-          <ac:chgData name="Mahmood, Hafiz" userId="18238e4e-7e2b-4e05-bbf7-86d51a419a23" providerId="ADAL" clId="{BF66D714-9115-4DD6-B634-E048A95B02B0}" dt="2026-02-01T17:15:33.145" v="138" actId="20577"/>
+          <ac:chgData name="Mahmood, Hafiz" userId="18238e4e-7e2b-4e05-bbf7-86d51a419a23" providerId="ADAL" clId="{BF66D714-9115-4DD6-B634-E048A95B02B0}" dt="2026-02-01T19:52:42.143" v="177"/>
           <ac:spMkLst>
             <pc:docMk/>
             <pc:sldMk cId="669017111" sldId="321"/>
             <ac:spMk id="4" creationId="{1A2E6F75-69D1-38E4-3DDD-BEC7BE7FE74E}"/>
           </ac:spMkLst>
         </pc:spChg>
+        <pc:picChg chg="add mod">
+          <ac:chgData name="Mahmood, Hafiz" userId="18238e4e-7e2b-4e05-bbf7-86d51a419a23" providerId="ADAL" clId="{BF66D714-9115-4DD6-B634-E048A95B02B0}" dt="2026-02-01T19:53:22.777" v="180" actId="14100"/>
+          <ac:picMkLst>
+            <pc:docMk/>
+            <pc:sldMk cId="669017111" sldId="321"/>
+            <ac:picMk id="6" creationId="{A67C36DB-C091-318C-8338-E55EB0EADCAD}"/>
+          </ac:picMkLst>
+        </pc:picChg>
       </pc:sldChg>
-      <pc:sldChg chg="modSp add mod">
-        <pc:chgData name="Mahmood, Hafiz" userId="18238e4e-7e2b-4e05-bbf7-86d51a419a23" providerId="ADAL" clId="{BF66D714-9115-4DD6-B634-E048A95B02B0}" dt="2026-02-01T17:18:27.247" v="156"/>
+      <pc:sldChg chg="addSp modSp add mod">
+        <pc:chgData name="Mahmood, Hafiz" userId="18238e4e-7e2b-4e05-bbf7-86d51a419a23" providerId="ADAL" clId="{BF66D714-9115-4DD6-B634-E048A95B02B0}" dt="2026-02-01T20:18:44.033" v="338" actId="20577"/>
         <pc:sldMkLst>
           <pc:docMk/>
           <pc:sldMk cId="1834763470" sldId="322"/>
         </pc:sldMkLst>
         <pc:spChg chg="mod">
-          <ac:chgData name="Mahmood, Hafiz" userId="18238e4e-7e2b-4e05-bbf7-86d51a419a23" providerId="ADAL" clId="{BF66D714-9115-4DD6-B634-E048A95B02B0}" dt="2026-02-01T17:18:17.654" v="155" actId="20577"/>
+          <ac:chgData name="Mahmood, Hafiz" userId="18238e4e-7e2b-4e05-bbf7-86d51a419a23" providerId="ADAL" clId="{BF66D714-9115-4DD6-B634-E048A95B02B0}" dt="2026-02-01T20:18:44.033" v="338" actId="20577"/>
           <ac:spMkLst>
             <pc:docMk/>
             <pc:sldMk cId="1834763470" sldId="322"/>
@@ -330,7 +397,7 @@
           </ac:spMkLst>
         </pc:spChg>
         <pc:spChg chg="mod">
-          <ac:chgData name="Mahmood, Hafiz" userId="18238e4e-7e2b-4e05-bbf7-86d51a419a23" providerId="ADAL" clId="{BF66D714-9115-4DD6-B634-E048A95B02B0}" dt="2026-02-01T17:18:27.247" v="156"/>
+          <ac:chgData name="Mahmood, Hafiz" userId="18238e4e-7e2b-4e05-bbf7-86d51a419a23" providerId="ADAL" clId="{BF66D714-9115-4DD6-B634-E048A95B02B0}" dt="2026-02-01T20:06:43.412" v="244" actId="20577"/>
           <ac:spMkLst>
             <pc:docMk/>
             <pc:sldMk cId="1834763470" sldId="322"/>
@@ -343,6 +410,75 @@
             <pc:docMk/>
             <pc:sldMk cId="1834763470" sldId="322"/>
             <ac:spMk id="4" creationId="{DDCFADCE-98BF-A031-9FA2-B20AA217480E}"/>
+          </ac:spMkLst>
+        </pc:spChg>
+        <pc:spChg chg="add mod">
+          <ac:chgData name="Mahmood, Hafiz" userId="18238e4e-7e2b-4e05-bbf7-86d51a419a23" providerId="ADAL" clId="{BF66D714-9115-4DD6-B634-E048A95B02B0}" dt="2026-02-01T20:17:26.226" v="332" actId="14100"/>
+          <ac:spMkLst>
+            <pc:docMk/>
+            <pc:sldMk cId="1834763470" sldId="322"/>
+            <ac:spMk id="6" creationId="{A86452B4-3B8C-B465-36F4-522F8DE8ED09}"/>
+          </ac:spMkLst>
+        </pc:spChg>
+      </pc:sldChg>
+      <pc:sldChg chg="addSp modSp add mod ord">
+        <pc:chgData name="Mahmood, Hafiz" userId="18238e4e-7e2b-4e05-bbf7-86d51a419a23" providerId="ADAL" clId="{BF66D714-9115-4DD6-B634-E048A95B02B0}" dt="2026-02-01T19:55:10.166" v="190" actId="14100"/>
+        <pc:sldMkLst>
+          <pc:docMk/>
+          <pc:sldMk cId="1931415753" sldId="323"/>
+        </pc:sldMkLst>
+        <pc:spChg chg="mod">
+          <ac:chgData name="Mahmood, Hafiz" userId="18238e4e-7e2b-4e05-bbf7-86d51a419a23" providerId="ADAL" clId="{BF66D714-9115-4DD6-B634-E048A95B02B0}" dt="2026-02-01T19:50:45.582" v="163" actId="20577"/>
+          <ac:spMkLst>
+            <pc:docMk/>
+            <pc:sldMk cId="1931415753" sldId="323"/>
+            <ac:spMk id="2" creationId="{A10AFC92-46DC-4561-AEB6-E56D25894F45}"/>
+          </ac:spMkLst>
+        </pc:spChg>
+        <pc:spChg chg="mod">
+          <ac:chgData name="Mahmood, Hafiz" userId="18238e4e-7e2b-4e05-bbf7-86d51a419a23" providerId="ADAL" clId="{BF66D714-9115-4DD6-B634-E048A95B02B0}" dt="2026-02-01T19:54:50.346" v="184" actId="20577"/>
+          <ac:spMkLst>
+            <pc:docMk/>
+            <pc:sldMk cId="1931415753" sldId="323"/>
+            <ac:spMk id="4" creationId="{71EE3963-69B2-255A-3F25-A91A3F5394F4}"/>
+          </ac:spMkLst>
+        </pc:spChg>
+        <pc:picChg chg="add mod">
+          <ac:chgData name="Mahmood, Hafiz" userId="18238e4e-7e2b-4e05-bbf7-86d51a419a23" providerId="ADAL" clId="{BF66D714-9115-4DD6-B634-E048A95B02B0}" dt="2026-02-01T19:55:10.166" v="190" actId="14100"/>
+          <ac:picMkLst>
+            <pc:docMk/>
+            <pc:sldMk cId="1931415753" sldId="323"/>
+            <ac:picMk id="6" creationId="{36898A25-31BF-157E-0C25-5EE4867CF4DE}"/>
+          </ac:picMkLst>
+        </pc:picChg>
+      </pc:sldChg>
+      <pc:sldChg chg="addSp modSp add mod">
+        <pc:chgData name="Mahmood, Hafiz" userId="18238e4e-7e2b-4e05-bbf7-86d51a419a23" providerId="ADAL" clId="{BF66D714-9115-4DD6-B634-E048A95B02B0}" dt="2026-02-01T20:08:58.275" v="249" actId="14100"/>
+        <pc:sldMkLst>
+          <pc:docMk/>
+          <pc:sldMk cId="1839389817" sldId="324"/>
+        </pc:sldMkLst>
+        <pc:picChg chg="add mod">
+          <ac:chgData name="Mahmood, Hafiz" userId="18238e4e-7e2b-4e05-bbf7-86d51a419a23" providerId="ADAL" clId="{BF66D714-9115-4DD6-B634-E048A95B02B0}" dt="2026-02-01T20:08:58.275" v="249" actId="14100"/>
+          <ac:picMkLst>
+            <pc:docMk/>
+            <pc:sldMk cId="1839389817" sldId="324"/>
+            <ac:picMk id="6" creationId="{30A5FAB3-8741-A329-0F85-D26786E35557}"/>
+          </ac:picMkLst>
+        </pc:picChg>
+      </pc:sldChg>
+      <pc:sldChg chg="modSp add mod">
+        <pc:chgData name="Mahmood, Hafiz" userId="18238e4e-7e2b-4e05-bbf7-86d51a419a23" providerId="ADAL" clId="{BF66D714-9115-4DD6-B634-E048A95B02B0}" dt="2026-02-01T20:15:53.411" v="325" actId="20577"/>
+        <pc:sldMkLst>
+          <pc:docMk/>
+          <pc:sldMk cId="2405996796" sldId="325"/>
+        </pc:sldMkLst>
+        <pc:spChg chg="mod">
+          <ac:chgData name="Mahmood, Hafiz" userId="18238e4e-7e2b-4e05-bbf7-86d51a419a23" providerId="ADAL" clId="{BF66D714-9115-4DD6-B634-E048A95B02B0}" dt="2026-02-01T20:15:53.411" v="325" actId="20577"/>
+          <ac:spMkLst>
+            <pc:docMk/>
+            <pc:sldMk cId="2405996796" sldId="325"/>
+            <ac:spMk id="6" creationId="{9DCE1B17-A509-AE16-ACCA-677178929523}"/>
           </ac:spMkLst>
         </pc:spChg>
       </pc:sldChg>
@@ -3636,6 +3772,114 @@
         <p:cNvPr id="1" name="">
           <a:extLst>
             <a:ext uri="{FF2B5EF4-FFF2-40B4-BE49-F238E27FC236}">
+              <a16:creationId xmlns:a16="http://schemas.microsoft.com/office/drawing/2014/main" id="{F28036E7-6D25-3E46-265D-E9E4F1AA947B}"/>
+            </a:ext>
+          </a:extLst>
+        </p:cNvPr>
+        <p:cNvGrpSpPr/>
+        <p:nvPr/>
+      </p:nvGrpSpPr>
+      <p:grpSpPr>
+        <a:xfrm>
+          <a:off x="0" y="0"/>
+          <a:ext cx="0" cy="0"/>
+          <a:chOff x="0" y="0"/>
+          <a:chExt cx="0" cy="0"/>
+        </a:xfrm>
+      </p:grpSpPr>
+      <p:sp>
+        <p:nvSpPr>
+          <p:cNvPr id="2" name="Slide Image Placeholder 1">
+            <a:extLst>
+              <a:ext uri="{FF2B5EF4-FFF2-40B4-BE49-F238E27FC236}">
+                <a16:creationId xmlns:a16="http://schemas.microsoft.com/office/drawing/2014/main" id="{AB5F2D8C-7451-F547-581A-76E894B8C376}"/>
+              </a:ext>
+            </a:extLst>
+          </p:cNvPr>
+          <p:cNvSpPr>
+            <a:spLocks noGrp="1" noRot="1" noChangeAspect="1"/>
+          </p:cNvSpPr>
+          <p:nvPr>
+            <p:ph type="sldImg"/>
+          </p:nvPr>
+        </p:nvSpPr>
+        <p:spPr/>
+      </p:sp>
+      <p:sp>
+        <p:nvSpPr>
+          <p:cNvPr id="3" name="Notes Placeholder 2">
+            <a:extLst>
+              <a:ext uri="{FF2B5EF4-FFF2-40B4-BE49-F238E27FC236}">
+                <a16:creationId xmlns:a16="http://schemas.microsoft.com/office/drawing/2014/main" id="{646DD43E-3C7E-0900-1E8B-77F761C3F73D}"/>
+              </a:ext>
+            </a:extLst>
+          </p:cNvPr>
+          <p:cNvSpPr>
+            <a:spLocks noGrp="1"/>
+          </p:cNvSpPr>
+          <p:nvPr>
+            <p:ph type="body" idx="1"/>
+          </p:nvPr>
+        </p:nvSpPr>
+        <p:spPr/>
+        <p:txBody>
+          <a:bodyPr/>
+          <a:lstStyle/>
+          <a:p>
+            <a:endParaRPr lang="en-GB"/>
+          </a:p>
+        </p:txBody>
+      </p:sp>
+      <p:sp>
+        <p:nvSpPr>
+          <p:cNvPr id="4" name="Slide Number Placeholder 3">
+            <a:extLst>
+              <a:ext uri="{FF2B5EF4-FFF2-40B4-BE49-F238E27FC236}">
+                <a16:creationId xmlns:a16="http://schemas.microsoft.com/office/drawing/2014/main" id="{FDF47821-8607-B962-8FD7-BBD89FAAB970}"/>
+              </a:ext>
+            </a:extLst>
+          </p:cNvPr>
+          <p:cNvSpPr>
+            <a:spLocks noGrp="1"/>
+          </p:cNvSpPr>
+          <p:nvPr>
+            <p:ph type="sldNum" sz="quarter" idx="5"/>
+          </p:nvPr>
+        </p:nvSpPr>
+        <p:spPr/>
+        <p:txBody>
+          <a:bodyPr/>
+          <a:lstStyle/>
+          <a:p>
+            <a:fld id="{8669876F-3BCE-5D4F-8061-3EC47FF884B3}" type="slidenum">
+              <a:rPr lang="en-GB" smtClean="0"/>
+              <a:t>38</a:t>
+            </a:fld>
+            <a:endParaRPr lang="en-GB"/>
+          </a:p>
+        </p:txBody>
+      </p:sp>
+    </p:spTree>
+    <p:extLst>
+      <p:ext uri="{BB962C8B-B14F-4D97-AF65-F5344CB8AC3E}">
+        <p14:creationId xmlns:p14="http://schemas.microsoft.com/office/powerpoint/2010/main" val="3050390878"/>
+      </p:ext>
+    </p:extLst>
+  </p:cSld>
+  <p:clrMapOvr>
+    <a:masterClrMapping/>
+  </p:clrMapOvr>
+</p:notes>
+</file>
+
+<file path=ppt/notesSlides/notesSlide39.xml><?xml version="1.0" encoding="utf-8"?>
+<p:notes xmlns:a="http://schemas.openxmlformats.org/drawingml/2006/main" xmlns:r="http://schemas.openxmlformats.org/officeDocument/2006/relationships" xmlns:p="http://schemas.openxmlformats.org/presentationml/2006/main">
+  <p:cSld>
+    <p:spTree>
+      <p:nvGrpSpPr>
+        <p:cNvPr id="1" name="">
+          <a:extLst>
+            <a:ext uri="{FF2B5EF4-FFF2-40B4-BE49-F238E27FC236}">
               <a16:creationId xmlns:a16="http://schemas.microsoft.com/office/drawing/2014/main" id="{5B4361E2-58AA-6CBA-7A0E-D1AACC85D97D}"/>
             </a:ext>
           </a:extLst>
@@ -3717,7 +3961,7 @@
           <a:p>
             <a:fld id="{8669876F-3BCE-5D4F-8061-3EC47FF884B3}" type="slidenum">
               <a:rPr lang="en-GB" smtClean="0"/>
-              <a:t>38</a:t>
+              <a:t>39</a:t>
             </a:fld>
             <a:endParaRPr lang="en-GB"/>
           </a:p>
@@ -3736,7 +3980,91 @@
 </p:notes>
 </file>
 
-<file path=ppt/notesSlides/notesSlide39.xml><?xml version="1.0" encoding="utf-8"?>
+<file path=ppt/notesSlides/notesSlide4.xml><?xml version="1.0" encoding="utf-8"?>
+<p:notes xmlns:a="http://schemas.openxmlformats.org/drawingml/2006/main" xmlns:r="http://schemas.openxmlformats.org/officeDocument/2006/relationships" xmlns:p="http://schemas.openxmlformats.org/presentationml/2006/main">
+  <p:cSld>
+    <p:spTree>
+      <p:nvGrpSpPr>
+        <p:cNvPr id="1" name=""/>
+        <p:cNvGrpSpPr/>
+        <p:nvPr/>
+      </p:nvGrpSpPr>
+      <p:grpSpPr>
+        <a:xfrm>
+          <a:off x="0" y="0"/>
+          <a:ext cx="0" cy="0"/>
+          <a:chOff x="0" y="0"/>
+          <a:chExt cx="0" cy="0"/>
+        </a:xfrm>
+      </p:grpSpPr>
+      <p:sp>
+        <p:nvSpPr>
+          <p:cNvPr id="2" name="Slide Image Placeholder 1"/>
+          <p:cNvSpPr>
+            <a:spLocks noGrp="1" noRot="1" noChangeAspect="1"/>
+          </p:cNvSpPr>
+          <p:nvPr>
+            <p:ph type="sldImg"/>
+          </p:nvPr>
+        </p:nvSpPr>
+        <p:spPr/>
+      </p:sp>
+      <p:sp>
+        <p:nvSpPr>
+          <p:cNvPr id="3" name="Notes Placeholder 2"/>
+          <p:cNvSpPr>
+            <a:spLocks noGrp="1"/>
+          </p:cNvSpPr>
+          <p:nvPr>
+            <p:ph type="body" idx="1"/>
+          </p:nvPr>
+        </p:nvSpPr>
+        <p:spPr/>
+        <p:txBody>
+          <a:bodyPr/>
+          <a:lstStyle/>
+          <a:p>
+            <a:endParaRPr lang="en-GB"/>
+          </a:p>
+        </p:txBody>
+      </p:sp>
+      <p:sp>
+        <p:nvSpPr>
+          <p:cNvPr id="4" name="Slide Number Placeholder 3"/>
+          <p:cNvSpPr>
+            <a:spLocks noGrp="1"/>
+          </p:cNvSpPr>
+          <p:nvPr>
+            <p:ph type="sldNum" sz="quarter" idx="5"/>
+          </p:nvPr>
+        </p:nvSpPr>
+        <p:spPr/>
+        <p:txBody>
+          <a:bodyPr/>
+          <a:lstStyle/>
+          <a:p>
+            <a:fld id="{8669876F-3BCE-5D4F-8061-3EC47FF884B3}" type="slidenum">
+              <a:rPr lang="en-GB" smtClean="0"/>
+              <a:t>4</a:t>
+            </a:fld>
+            <a:endParaRPr lang="en-GB"/>
+          </a:p>
+        </p:txBody>
+      </p:sp>
+    </p:spTree>
+    <p:extLst>
+      <p:ext uri="{BB962C8B-B14F-4D97-AF65-F5344CB8AC3E}">
+        <p14:creationId xmlns:p14="http://schemas.microsoft.com/office/powerpoint/2010/main" val="457263607"/>
+      </p:ext>
+    </p:extLst>
+  </p:cSld>
+  <p:clrMapOvr>
+    <a:masterClrMapping/>
+  </p:clrMapOvr>
+</p:notes>
+</file>
+
+<file path=ppt/notesSlides/notesSlide40.xml><?xml version="1.0" encoding="utf-8"?>
 <p:notes xmlns:a="http://schemas.openxmlformats.org/drawingml/2006/main" xmlns:r="http://schemas.openxmlformats.org/officeDocument/2006/relationships" xmlns:p="http://schemas.openxmlformats.org/presentationml/2006/main">
   <p:cSld>
     <p:spTree>
@@ -3825,7 +4153,7 @@
           <a:p>
             <a:fld id="{8669876F-3BCE-5D4F-8061-3EC47FF884B3}" type="slidenum">
               <a:rPr lang="en-GB" smtClean="0"/>
-              <a:t>39</a:t>
+              <a:t>40</a:t>
             </a:fld>
             <a:endParaRPr lang="en-GB"/>
           </a:p>
@@ -3844,12 +4172,18 @@
 </p:notes>
 </file>
 
-<file path=ppt/notesSlides/notesSlide4.xml><?xml version="1.0" encoding="utf-8"?>
+<file path=ppt/notesSlides/notesSlide41.xml><?xml version="1.0" encoding="utf-8"?>
 <p:notes xmlns:a="http://schemas.openxmlformats.org/drawingml/2006/main" xmlns:r="http://schemas.openxmlformats.org/officeDocument/2006/relationships" xmlns:p="http://schemas.openxmlformats.org/presentationml/2006/main">
   <p:cSld>
     <p:spTree>
       <p:nvGrpSpPr>
-        <p:cNvPr id="1" name=""/>
+        <p:cNvPr id="1" name="">
+          <a:extLst>
+            <a:ext uri="{FF2B5EF4-FFF2-40B4-BE49-F238E27FC236}">
+              <a16:creationId xmlns:a16="http://schemas.microsoft.com/office/drawing/2014/main" id="{9BA6732B-4FBB-1263-3E1B-2A4B35234489}"/>
+            </a:ext>
+          </a:extLst>
+        </p:cNvPr>
         <p:cNvGrpSpPr/>
         <p:nvPr/>
       </p:nvGrpSpPr>
@@ -3863,7 +4197,13 @@
       </p:grpSpPr>
       <p:sp>
         <p:nvSpPr>
-          <p:cNvPr id="2" name="Slide Image Placeholder 1"/>
+          <p:cNvPr id="2" name="Slide Image Placeholder 1">
+            <a:extLst>
+              <a:ext uri="{FF2B5EF4-FFF2-40B4-BE49-F238E27FC236}">
+                <a16:creationId xmlns:a16="http://schemas.microsoft.com/office/drawing/2014/main" id="{BFDBA25F-6D17-71D3-C4DB-D09DFCBA056C}"/>
+              </a:ext>
+            </a:extLst>
+          </p:cNvPr>
           <p:cNvSpPr>
             <a:spLocks noGrp="1" noRot="1" noChangeAspect="1"/>
           </p:cNvSpPr>
@@ -3875,7 +4215,13 @@
       </p:sp>
       <p:sp>
         <p:nvSpPr>
-          <p:cNvPr id="3" name="Notes Placeholder 2"/>
+          <p:cNvPr id="3" name="Notes Placeholder 2">
+            <a:extLst>
+              <a:ext uri="{FF2B5EF4-FFF2-40B4-BE49-F238E27FC236}">
+                <a16:creationId xmlns:a16="http://schemas.microsoft.com/office/drawing/2014/main" id="{64557592-4520-4085-DB76-447F7C05FD45}"/>
+              </a:ext>
+            </a:extLst>
+          </p:cNvPr>
           <p:cNvSpPr>
             <a:spLocks noGrp="1"/>
           </p:cNvSpPr>
@@ -3894,7 +4240,13 @@
       </p:sp>
       <p:sp>
         <p:nvSpPr>
-          <p:cNvPr id="4" name="Slide Number Placeholder 3"/>
+          <p:cNvPr id="4" name="Slide Number Placeholder 3">
+            <a:extLst>
+              <a:ext uri="{FF2B5EF4-FFF2-40B4-BE49-F238E27FC236}">
+                <a16:creationId xmlns:a16="http://schemas.microsoft.com/office/drawing/2014/main" id="{11409104-F03C-B2DF-1511-C5B2A44A07D1}"/>
+              </a:ext>
+            </a:extLst>
+          </p:cNvPr>
           <p:cNvSpPr>
             <a:spLocks noGrp="1"/>
           </p:cNvSpPr>
@@ -3909,7 +4261,7 @@
           <a:p>
             <a:fld id="{8669876F-3BCE-5D4F-8061-3EC47FF884B3}" type="slidenum">
               <a:rPr lang="en-GB" smtClean="0"/>
-              <a:t>4</a:t>
+              <a:t>41</a:t>
             </a:fld>
             <a:endParaRPr lang="en-GB"/>
           </a:p>
@@ -3918,7 +4270,115 @@
     </p:spTree>
     <p:extLst>
       <p:ext uri="{BB962C8B-B14F-4D97-AF65-F5344CB8AC3E}">
-        <p14:creationId xmlns:p14="http://schemas.microsoft.com/office/powerpoint/2010/main" val="457263607"/>
+        <p14:creationId xmlns:p14="http://schemas.microsoft.com/office/powerpoint/2010/main" val="1475651234"/>
+      </p:ext>
+    </p:extLst>
+  </p:cSld>
+  <p:clrMapOvr>
+    <a:masterClrMapping/>
+  </p:clrMapOvr>
+</p:notes>
+</file>
+
+<file path=ppt/notesSlides/notesSlide42.xml><?xml version="1.0" encoding="utf-8"?>
+<p:notes xmlns:a="http://schemas.openxmlformats.org/drawingml/2006/main" xmlns:r="http://schemas.openxmlformats.org/officeDocument/2006/relationships" xmlns:p="http://schemas.openxmlformats.org/presentationml/2006/main">
+  <p:cSld>
+    <p:spTree>
+      <p:nvGrpSpPr>
+        <p:cNvPr id="1" name="">
+          <a:extLst>
+            <a:ext uri="{FF2B5EF4-FFF2-40B4-BE49-F238E27FC236}">
+              <a16:creationId xmlns:a16="http://schemas.microsoft.com/office/drawing/2014/main" id="{C726AD65-C2FD-4406-0852-C470AC29F670}"/>
+            </a:ext>
+          </a:extLst>
+        </p:cNvPr>
+        <p:cNvGrpSpPr/>
+        <p:nvPr/>
+      </p:nvGrpSpPr>
+      <p:grpSpPr>
+        <a:xfrm>
+          <a:off x="0" y="0"/>
+          <a:ext cx="0" cy="0"/>
+          <a:chOff x="0" y="0"/>
+          <a:chExt cx="0" cy="0"/>
+        </a:xfrm>
+      </p:grpSpPr>
+      <p:sp>
+        <p:nvSpPr>
+          <p:cNvPr id="2" name="Slide Image Placeholder 1">
+            <a:extLst>
+              <a:ext uri="{FF2B5EF4-FFF2-40B4-BE49-F238E27FC236}">
+                <a16:creationId xmlns:a16="http://schemas.microsoft.com/office/drawing/2014/main" id="{8A79E9E9-6230-A5A3-C016-9A9076F29EBD}"/>
+              </a:ext>
+            </a:extLst>
+          </p:cNvPr>
+          <p:cNvSpPr>
+            <a:spLocks noGrp="1" noRot="1" noChangeAspect="1"/>
+          </p:cNvSpPr>
+          <p:nvPr>
+            <p:ph type="sldImg"/>
+          </p:nvPr>
+        </p:nvSpPr>
+        <p:spPr/>
+      </p:sp>
+      <p:sp>
+        <p:nvSpPr>
+          <p:cNvPr id="3" name="Notes Placeholder 2">
+            <a:extLst>
+              <a:ext uri="{FF2B5EF4-FFF2-40B4-BE49-F238E27FC236}">
+                <a16:creationId xmlns:a16="http://schemas.microsoft.com/office/drawing/2014/main" id="{C623E2C1-B197-44CB-B507-2C778AF80DE4}"/>
+              </a:ext>
+            </a:extLst>
+          </p:cNvPr>
+          <p:cNvSpPr>
+            <a:spLocks noGrp="1"/>
+          </p:cNvSpPr>
+          <p:nvPr>
+            <p:ph type="body" idx="1"/>
+          </p:nvPr>
+        </p:nvSpPr>
+        <p:spPr/>
+        <p:txBody>
+          <a:bodyPr/>
+          <a:lstStyle/>
+          <a:p>
+            <a:endParaRPr lang="en-GB"/>
+          </a:p>
+        </p:txBody>
+      </p:sp>
+      <p:sp>
+        <p:nvSpPr>
+          <p:cNvPr id="4" name="Slide Number Placeholder 3">
+            <a:extLst>
+              <a:ext uri="{FF2B5EF4-FFF2-40B4-BE49-F238E27FC236}">
+                <a16:creationId xmlns:a16="http://schemas.microsoft.com/office/drawing/2014/main" id="{7426BA2F-C6AE-4425-3E88-EF3AA25D5377}"/>
+              </a:ext>
+            </a:extLst>
+          </p:cNvPr>
+          <p:cNvSpPr>
+            <a:spLocks noGrp="1"/>
+          </p:cNvSpPr>
+          <p:nvPr>
+            <p:ph type="sldNum" sz="quarter" idx="5"/>
+          </p:nvPr>
+        </p:nvSpPr>
+        <p:spPr/>
+        <p:txBody>
+          <a:bodyPr/>
+          <a:lstStyle/>
+          <a:p>
+            <a:fld id="{8669876F-3BCE-5D4F-8061-3EC47FF884B3}" type="slidenum">
+              <a:rPr lang="en-GB" smtClean="0"/>
+              <a:t>42</a:t>
+            </a:fld>
+            <a:endParaRPr lang="en-GB"/>
+          </a:p>
+        </p:txBody>
+      </p:sp>
+    </p:spTree>
+    <p:extLst>
+      <p:ext uri="{BB962C8B-B14F-4D97-AF65-F5344CB8AC3E}">
+        <p14:creationId xmlns:p14="http://schemas.microsoft.com/office/powerpoint/2010/main" val="2320837072"/>
       </p:ext>
     </p:extLst>
   </p:cSld>
@@ -18218,135 +18678,52 @@
           </a:bodyPr>
           <a:lstStyle/>
           <a:p>
-            <a:pPr marL="342900" indent="-342900">
-              <a:buFont typeface="Arial" panose="020B0604020202020204" pitchFamily="34" charset="0"/>
-              <a:buChar char="•"/>
-              <a:defRPr sz="1400"/>
-            </a:pPr>
+            <a:r>
+              <a:rPr lang="en-GB" b="1" dirty="0"/>
+              <a:t>What is a variable in Python? 🧾</a:t>
+            </a:r>
+          </a:p>
+          <a:p>
             <a:r>
               <a:rPr lang="en-GB" dirty="0"/>
-              <a:t>Python uses names (variables) to store values. Types are inferred automatically (dynamic typing), so a variable can hold any type.</a:t>
-            </a:r>
-          </a:p>
-          <a:p>
-            <a:pPr marL="342900" indent="-342900">
-              <a:buFont typeface="Arial" panose="020B0604020202020204" pitchFamily="34" charset="0"/>
-              <a:buChar char="•"/>
-              <a:defRPr sz="1400"/>
-            </a:pPr>
-            <a:r>
-              <a:rPr lang="en-GB" dirty="0"/>
-              <a:t>Variables : assign with,   name = "Alice"</a:t>
-            </a:r>
-          </a:p>
-          <a:p>
-            <a:pPr marL="342900" indent="-342900">
-              <a:buFont typeface="Arial" panose="020B0604020202020204" pitchFamily="34" charset="0"/>
-              <a:buChar char="•"/>
-              <a:defRPr sz="1400"/>
-            </a:pPr>
-            <a:r>
-              <a:rPr lang="en-GB" dirty="0"/>
-              <a:t>Common types : integers, floats, strings, </a:t>
-            </a:r>
-            <a:r>
-              <a:rPr lang="en-GB" dirty="0" err="1"/>
-              <a:t>booleans</a:t>
-            </a:r>
-            <a:r>
-              <a:rPr lang="en-GB" dirty="0"/>
-              <a:t> , use type(x) to inspect</a:t>
-            </a:r>
-          </a:p>
-          <a:p>
-            <a:pPr marL="342900" indent="-342900">
-              <a:buFont typeface="Arial" panose="020B0604020202020204" pitchFamily="34" charset="0"/>
-              <a:buChar char="•"/>
-              <a:defRPr sz="1400"/>
-            </a:pPr>
-            <a:r>
-              <a:rPr lang="en-GB" dirty="0"/>
-              <a:t>Containers : list , </a:t>
-            </a:r>
-            <a:r>
-              <a:rPr lang="en-GB" dirty="0" err="1"/>
-              <a:t>dict</a:t>
-            </a:r>
-            <a:r>
-              <a:rPr lang="en-GB" dirty="0"/>
-              <a:t> , tuple , set ,  choose by need (ordered, mutable, unique)</a:t>
-            </a:r>
-          </a:p>
-          <a:p>
-            <a:pPr>
-              <a:defRPr sz="1400"/>
-            </a:pPr>
-            <a:endParaRPr lang="en-GB" sz="2800" dirty="0"/>
-          </a:p>
-          <a:p>
-            <a:pPr marL="342900" indent="-342900">
-              <a:buFont typeface="Arial" panose="020B0604020202020204" pitchFamily="34" charset="0"/>
-              <a:buChar char="•"/>
-              <a:defRPr sz="1400"/>
-            </a:pPr>
-            <a:r>
-              <a:rPr lang="en-GB" sz="1400" dirty="0"/>
-              <a:t># Example: types and inspection</a:t>
-            </a:r>
-          </a:p>
-          <a:p>
-            <a:pPr marL="342900" indent="-342900">
-              <a:buFont typeface="Arial" panose="020B0604020202020204" pitchFamily="34" charset="0"/>
-              <a:buChar char="•"/>
-              <a:defRPr sz="1400"/>
-            </a:pPr>
-            <a:r>
-              <a:rPr lang="en-GB" sz="1400" dirty="0"/>
-              <a:t>age = 20            # int</a:t>
-            </a:r>
-          </a:p>
-          <a:p>
-            <a:pPr marL="342900" indent="-342900">
-              <a:buFont typeface="Arial" panose="020B0604020202020204" pitchFamily="34" charset="0"/>
-              <a:buChar char="•"/>
-              <a:defRPr sz="1400"/>
-            </a:pPr>
-            <a:r>
-              <a:rPr lang="en-GB" sz="1400" dirty="0"/>
-              <a:t>pi = 3.14           # float</a:t>
-            </a:r>
-          </a:p>
-          <a:p>
-            <a:pPr marL="342900" indent="-342900">
-              <a:buFont typeface="Arial" panose="020B0604020202020204" pitchFamily="34" charset="0"/>
-              <a:buChar char="•"/>
-              <a:defRPr sz="1400"/>
-            </a:pPr>
-            <a:r>
-              <a:rPr lang="en-GB" sz="1400" dirty="0"/>
-              <a:t>name = "Alice"     # str</a:t>
-            </a:r>
-          </a:p>
-          <a:p>
-            <a:pPr marL="342900" indent="-342900">
-              <a:buFont typeface="Arial" panose="020B0604020202020204" pitchFamily="34" charset="0"/>
-              <a:buChar char="•"/>
-              <a:defRPr sz="1400"/>
-            </a:pPr>
-            <a:r>
-              <a:rPr lang="en-GB" sz="1400" dirty="0"/>
-              <a:t>print(type(age), type(name))  # &lt;class 'int'&gt; &lt;class 'str'&gt;</a:t>
-            </a:r>
-          </a:p>
-          <a:p>
-            <a:pPr marL="342900" indent="-342900">
-              <a:buFont typeface="Arial" panose="020B0604020202020204" pitchFamily="34" charset="0"/>
-              <a:buChar char="•"/>
-            </a:pPr>
+              <a:t>A variable is a name that stores a value; Python figures out the value’s type automatically (dynamic typing).</a:t>
+            </a:r>
+          </a:p>
+          <a:p>
             <a:endParaRPr lang="en-GB" sz="2800" dirty="0"/>
           </a:p>
         </p:txBody>
       </p:sp>
+      <p:pic>
+        <p:nvPicPr>
+          <p:cNvPr id="5" name="Picture 4">
+            <a:extLst>
+              <a:ext uri="{FF2B5EF4-FFF2-40B4-BE49-F238E27FC236}">
+                <a16:creationId xmlns:a16="http://schemas.microsoft.com/office/drawing/2014/main" id="{A2F2FD5C-4EEA-66E2-CC62-FC7C5B47753D}"/>
+              </a:ext>
+            </a:extLst>
+          </p:cNvPr>
+          <p:cNvPicPr>
+            <a:picLocks noChangeAspect="1"/>
+          </p:cNvPicPr>
+          <p:nvPr/>
+        </p:nvPicPr>
+        <p:blipFill>
+          <a:blip r:embed="rId3"/>
+          <a:stretch>
+            <a:fillRect/>
+          </a:stretch>
+        </p:blipFill>
+        <p:spPr>
+          <a:xfrm>
+            <a:off x="1071207" y="2711412"/>
+            <a:ext cx="5457412" cy="2096561"/>
+          </a:xfrm>
+          <a:prstGeom prst="rect">
+            <a:avLst/>
+          </a:prstGeom>
+        </p:spPr>
+      </p:pic>
     </p:spTree>
     <p:extLst>
       <p:ext uri="{BB962C8B-B14F-4D97-AF65-F5344CB8AC3E}">
@@ -18430,7 +18807,7 @@
             </a:r>
             <a:r>
               <a:rPr lang="en-GB" dirty="0"/>
-              <a:t> Control flow — If / For / While</a:t>
+              <a:t> Control flow:   If</a:t>
             </a:r>
             <a:br>
               <a:rPr lang="en-GB" dirty="0"/>
@@ -18457,7 +18834,7 @@
         </p:nvSpPr>
         <p:spPr>
           <a:xfrm>
-            <a:off x="381001" y="1243584"/>
+            <a:off x="381000" y="1518887"/>
             <a:ext cx="11430000" cy="5068317"/>
           </a:xfrm>
         </p:spPr>
@@ -18469,93 +18846,25 @@
           <a:p>
             <a:r>
               <a:rPr lang="en-GB" b="1" dirty="0"/>
-              <a:t>Key idea:</a:t>
+              <a:t>If condition ✅</a:t>
+            </a:r>
+          </a:p>
+          <a:p>
+            <a:r>
+              <a:rPr lang="en-GB" b="1" dirty="0"/>
+              <a:t>If</a:t>
             </a:r>
             <a:r>
               <a:rPr lang="en-GB" dirty="0"/>
-              <a:t> Indentation matters — Python uses whitespace for blocks (no braces).</a:t>
-            </a:r>
-          </a:p>
-          <a:p>
-            <a:r>
-              <a:rPr lang="en-GB" b="1" dirty="0"/>
-              <a:t>If / </a:t>
-            </a:r>
-            <a:r>
-              <a:rPr lang="en-GB" b="1" dirty="0" err="1"/>
-              <a:t>elif</a:t>
-            </a:r>
-            <a:r>
-              <a:rPr lang="en-GB" b="1" dirty="0"/>
-              <a:t> / else</a:t>
-            </a:r>
-            <a:r>
-              <a:rPr lang="en-GB" dirty="0"/>
-              <a:t> — branching by condition</a:t>
-            </a:r>
-          </a:p>
-          <a:p>
-            <a:endParaRPr lang="en-GB" dirty="0"/>
-          </a:p>
-          <a:p>
-            <a:endParaRPr lang="en-GB" dirty="0"/>
-          </a:p>
-          <a:p>
-            <a:pPr marL="685800" lvl="4" indent="0">
-              <a:buNone/>
-            </a:pPr>
-            <a:r>
-              <a:rPr lang="en-GB" dirty="0"/>
-              <a:t>if score &gt;= 70:</a:t>
-            </a:r>
-          </a:p>
-          <a:p>
-            <a:pPr marL="685800" lvl="4" indent="0">
-              <a:buNone/>
-            </a:pPr>
-            <a:r>
-              <a:rPr lang="en-GB" dirty="0"/>
-              <a:t>    print("Pass")</a:t>
-            </a:r>
-          </a:p>
-          <a:p>
-            <a:pPr marL="685800" lvl="4" indent="0">
-              <a:buNone/>
-            </a:pPr>
+              <a:t> runs a block of code only when a Boolean expression is True (use </a:t>
+            </a:r>
             <a:r>
               <a:rPr lang="en-GB" dirty="0" err="1"/>
               <a:t>elif</a:t>
             </a:r>
             <a:r>
               <a:rPr lang="en-GB" dirty="0"/>
-              <a:t> score &gt;= 50:</a:t>
-            </a:r>
-          </a:p>
-          <a:p>
-            <a:pPr marL="685800" lvl="4" indent="0">
-              <a:buNone/>
-            </a:pPr>
-            <a:r>
-              <a:rPr lang="en-GB" dirty="0"/>
-              <a:t>    print("Resit")</a:t>
-            </a:r>
-          </a:p>
-          <a:p>
-            <a:pPr marL="685800" lvl="4" indent="0">
-              <a:buNone/>
-            </a:pPr>
-            <a:r>
-              <a:rPr lang="en-GB" dirty="0"/>
-              <a:t>else:</a:t>
-            </a:r>
-          </a:p>
-          <a:p>
-            <a:pPr marL="685800" lvl="4" indent="0">
-              <a:buNone/>
-            </a:pPr>
-            <a:r>
-              <a:rPr lang="en-GB" dirty="0"/>
-              <a:t>    print("Fail")</a:t>
+              <a:t> and else for alternatives)</a:t>
             </a:r>
           </a:p>
           <a:p>
@@ -18566,6 +18875,36 @@
           </a:p>
         </p:txBody>
       </p:sp>
+      <p:pic>
+        <p:nvPicPr>
+          <p:cNvPr id="5" name="Picture 4">
+            <a:extLst>
+              <a:ext uri="{FF2B5EF4-FFF2-40B4-BE49-F238E27FC236}">
+                <a16:creationId xmlns:a16="http://schemas.microsoft.com/office/drawing/2014/main" id="{A42B4A7B-7F81-18EA-0E06-9344963657C1}"/>
+              </a:ext>
+            </a:extLst>
+          </p:cNvPr>
+          <p:cNvPicPr>
+            <a:picLocks noChangeAspect="1"/>
+          </p:cNvPicPr>
+          <p:nvPr/>
+        </p:nvPicPr>
+        <p:blipFill>
+          <a:blip r:embed="rId3"/>
+          <a:stretch>
+            <a:fillRect/>
+          </a:stretch>
+        </p:blipFill>
+        <p:spPr>
+          <a:xfrm>
+            <a:off x="969648" y="2911448"/>
+            <a:ext cx="2687951" cy="1640887"/>
+          </a:xfrm>
+          <a:prstGeom prst="rect">
+            <a:avLst/>
+          </a:prstGeom>
+        </p:spPr>
+      </p:pic>
     </p:spTree>
     <p:extLst>
       <p:ext uri="{BB962C8B-B14F-4D97-AF65-F5344CB8AC3E}">
@@ -18649,7 +18988,7 @@
             </a:r>
             <a:r>
               <a:rPr lang="en-GB" dirty="0"/>
-              <a:t> Control flow — If / For / While</a:t>
+              <a:t> Control flow :  For</a:t>
             </a:r>
             <a:br>
               <a:rPr lang="en-GB" dirty="0"/>
@@ -18688,11 +19027,13 @@
           <a:p>
             <a:r>
               <a:rPr lang="en-GB" b="1" dirty="0"/>
-              <a:t>For</a:t>
-            </a:r>
+              <a:t>For loop 🔁</a:t>
+            </a:r>
+          </a:p>
+          <a:p>
             <a:r>
               <a:rPr lang="en-GB" dirty="0"/>
-              <a:t> — iterate any </a:t>
+              <a:t>Repeats a block of code once for each item in an </a:t>
             </a:r>
             <a:r>
               <a:rPr lang="en-GB" dirty="0" err="1"/>
@@ -18700,7 +19041,7 @@
             </a:r>
             <a:r>
               <a:rPr lang="en-GB" dirty="0"/>
-              <a:t> (list, range, </a:t>
+              <a:t> (list, range, string, </a:t>
             </a:r>
             <a:r>
               <a:rPr lang="en-GB" dirty="0" err="1"/>
@@ -18708,43 +19049,13 @@
             </a:r>
             <a:r>
               <a:rPr lang="en-GB" dirty="0"/>
-              <a:t> keys)</a:t>
-            </a:r>
-          </a:p>
-          <a:p>
-            <a:endParaRPr lang="en-GB" dirty="0"/>
-          </a:p>
-          <a:p>
-            <a:pPr lvl="4"/>
-            <a:r>
-              <a:rPr lang="en-GB" dirty="0"/>
-              <a:t>for i in range(3):</a:t>
+              <a:t>, etc.).</a:t>
             </a:r>
           </a:p>
           <a:p>
             <a:pPr marL="685800" lvl="4" indent="0">
               <a:buNone/>
             </a:pPr>
-            <a:r>
-              <a:rPr lang="en-GB" dirty="0"/>
-              <a:t>    print(i)</a:t>
-            </a:r>
-          </a:p>
-          <a:p>
-            <a:pPr lvl="4"/>
-            <a:r>
-              <a:rPr lang="en-GB" dirty="0"/>
-              <a:t>for item in items:</a:t>
-            </a:r>
-          </a:p>
-          <a:p>
-            <a:pPr marL="685800" lvl="4" indent="0">
-              <a:buNone/>
-            </a:pPr>
-            <a:r>
-              <a:rPr lang="en-GB" dirty="0"/>
-              <a:t>    print(item)</a:t>
-            </a:r>
             <a:br>
               <a:rPr lang="en-GB" dirty="0"/>
             </a:br>
@@ -18752,6 +19063,36 @@
           </a:p>
         </p:txBody>
       </p:sp>
+      <p:pic>
+        <p:nvPicPr>
+          <p:cNvPr id="5" name="Picture 4">
+            <a:extLst>
+              <a:ext uri="{FF2B5EF4-FFF2-40B4-BE49-F238E27FC236}">
+                <a16:creationId xmlns:a16="http://schemas.microsoft.com/office/drawing/2014/main" id="{B39CE892-0D99-722B-67CF-9ADEEB8A7E73}"/>
+              </a:ext>
+            </a:extLst>
+          </p:cNvPr>
+          <p:cNvPicPr>
+            <a:picLocks noChangeAspect="1"/>
+          </p:cNvPicPr>
+          <p:nvPr/>
+        </p:nvPicPr>
+        <p:blipFill>
+          <a:blip r:embed="rId3"/>
+          <a:stretch>
+            <a:fillRect/>
+          </a:stretch>
+        </p:blipFill>
+        <p:spPr>
+          <a:xfrm>
+            <a:off x="814481" y="2404542"/>
+            <a:ext cx="3128254" cy="3042529"/>
+          </a:xfrm>
+          <a:prstGeom prst="rect">
+            <a:avLst/>
+          </a:prstGeom>
+        </p:spPr>
+      </p:pic>
     </p:spTree>
     <p:extLst>
       <p:ext uri="{BB962C8B-B14F-4D97-AF65-F5344CB8AC3E}">
@@ -18762,13 +19103,13 @@
   <p:clrMapOvr>
     <a:masterClrMapping/>
   </p:clrMapOvr>
-  <mc:AlternateContent xmlns:mc="http://schemas.openxmlformats.org/markup-compatibility/2006">
-    <mc:Choice xmlns:p14="http://schemas.microsoft.com/office/powerpoint/2010/main" Requires="p14">
+  <mc:AlternateContent xmlns:mc="http://schemas.openxmlformats.org/markup-compatibility/2006" xmlns:p14="http://schemas.microsoft.com/office/powerpoint/2010/main">
+    <mc:Choice Requires="p14">
       <p:transition spd="med" p14:dur="700">
         <p:fade/>
       </p:transition>
     </mc:Choice>
-    <mc:Fallback>
+    <mc:Fallback xmlns="">
       <p:transition spd="med">
         <p:fade/>
       </p:transition>
@@ -18835,7 +19176,7 @@
             </a:r>
             <a:r>
               <a:rPr lang="en-GB" dirty="0"/>
-              <a:t> Control flow — If / For / While</a:t>
+              <a:t> Control flow : While</a:t>
             </a:r>
             <a:br>
               <a:rPr lang="en-GB" dirty="0"/>
@@ -18874,54 +19215,26 @@
           <a:p>
             <a:r>
               <a:rPr lang="en-GB" b="1" dirty="0"/>
-              <a:t>While</a:t>
+              <a:t>What is a while loop in Python? 🔁</a:t>
+            </a:r>
+          </a:p>
+          <a:p>
+            <a:r>
+              <a:rPr lang="en-GB" b="1" dirty="0"/>
+              <a:t>One-liner:</a:t>
             </a:r>
             <a:r>
               <a:rPr lang="en-GB" dirty="0"/>
-              <a:t> — repeat while condition true (watch for infinite loops</a:t>
-            </a:r>
-          </a:p>
-          <a:p>
-            <a:endParaRPr lang="en-GB" dirty="0"/>
-          </a:p>
-          <a:p>
-            <a:endParaRPr lang="en-GB" dirty="0"/>
-          </a:p>
-          <a:p>
-            <a:pPr marL="457200" lvl="3" indent="0">
-              <a:buNone/>
-            </a:pPr>
-            <a:r>
-              <a:rPr lang="pt-BR" dirty="0"/>
-              <a:t>n = 5</a:t>
-            </a:r>
-          </a:p>
-          <a:p>
-            <a:pPr marL="457200" lvl="3" indent="0">
-              <a:buNone/>
-            </a:pPr>
-            <a:r>
-              <a:rPr lang="pt-BR" dirty="0"/>
-              <a:t>while n &gt; 0:</a:t>
-            </a:r>
-          </a:p>
-          <a:p>
-            <a:pPr marL="457200" lvl="3" indent="0">
-              <a:buNone/>
-            </a:pPr>
-            <a:r>
-              <a:rPr lang="pt-BR" dirty="0"/>
-              <a:t>    print(n)</a:t>
-            </a:r>
-          </a:p>
-          <a:p>
-            <a:pPr marL="457200" lvl="3" indent="0">
-              <a:buNone/>
-            </a:pPr>
-            <a:r>
-              <a:rPr lang="pt-BR" dirty="0"/>
-              <a:t>    n -= 1</a:t>
-            </a:r>
+              <a:t> Repeats a block of code as long as a condition remains true.</a:t>
+            </a:r>
+          </a:p>
+          <a:p>
+            <a:r>
+              <a:rPr lang="en-GB" dirty="0"/>
+              <a:t>	</a:t>
+            </a:r>
+          </a:p>
+          <a:p>
             <a:br>
               <a:rPr lang="en-GB" dirty="0"/>
             </a:br>
@@ -18929,10 +19242,466 @@
           </a:p>
         </p:txBody>
       </p:sp>
+      <p:pic>
+        <p:nvPicPr>
+          <p:cNvPr id="5" name="Picture 4">
+            <a:extLst>
+              <a:ext uri="{FF2B5EF4-FFF2-40B4-BE49-F238E27FC236}">
+                <a16:creationId xmlns:a16="http://schemas.microsoft.com/office/drawing/2014/main" id="{E15EC405-842D-A776-C637-AB1F166A6CD0}"/>
+              </a:ext>
+            </a:extLst>
+          </p:cNvPr>
+          <p:cNvPicPr>
+            <a:picLocks noChangeAspect="1"/>
+          </p:cNvPicPr>
+          <p:nvPr/>
+        </p:nvPicPr>
+        <p:blipFill>
+          <a:blip r:embed="rId3"/>
+          <a:stretch>
+            <a:fillRect/>
+          </a:stretch>
+        </p:blipFill>
+        <p:spPr>
+          <a:xfrm>
+            <a:off x="1754727" y="2514477"/>
+            <a:ext cx="2256833" cy="1703562"/>
+          </a:xfrm>
+          <a:prstGeom prst="rect">
+            <a:avLst/>
+          </a:prstGeom>
+        </p:spPr>
+      </p:pic>
+      <p:pic>
+        <p:nvPicPr>
+          <p:cNvPr id="7" name="Picture 6">
+            <a:extLst>
+              <a:ext uri="{FF2B5EF4-FFF2-40B4-BE49-F238E27FC236}">
+                <a16:creationId xmlns:a16="http://schemas.microsoft.com/office/drawing/2014/main" id="{74E1CAAA-EF8F-63AA-80DA-4ECA7884E4A8}"/>
+              </a:ext>
+            </a:extLst>
+          </p:cNvPr>
+          <p:cNvPicPr>
+            <a:picLocks noChangeAspect="1"/>
+          </p:cNvPicPr>
+          <p:nvPr/>
+        </p:nvPicPr>
+        <p:blipFill>
+          <a:blip r:embed="rId4"/>
+          <a:stretch>
+            <a:fillRect/>
+          </a:stretch>
+        </p:blipFill>
+        <p:spPr>
+          <a:xfrm>
+            <a:off x="4788308" y="2577219"/>
+            <a:ext cx="2340077" cy="1703562"/>
+          </a:xfrm>
+          <a:prstGeom prst="rect">
+            <a:avLst/>
+          </a:prstGeom>
+        </p:spPr>
+      </p:pic>
     </p:spTree>
     <p:extLst>
       <p:ext uri="{BB962C8B-B14F-4D97-AF65-F5344CB8AC3E}">
         <p14:creationId xmlns:p14="http://schemas.microsoft.com/office/powerpoint/2010/main" val="1458757690"/>
+      </p:ext>
+    </p:extLst>
+  </p:cSld>
+  <p:clrMapOvr>
+    <a:masterClrMapping/>
+  </p:clrMapOvr>
+  <mc:AlternateContent xmlns:mc="http://schemas.openxmlformats.org/markup-compatibility/2006" xmlns:p14="http://schemas.microsoft.com/office/powerpoint/2010/main">
+    <mc:Choice Requires="p14">
+      <p:transition spd="med" p14:dur="700">
+        <p:fade/>
+      </p:transition>
+    </mc:Choice>
+    <mc:Fallback xmlns="">
+      <p:transition spd="med">
+        <p:fade/>
+      </p:transition>
+    </mc:Fallback>
+  </mc:AlternateContent>
+</p:sld>
+</file>
+
+<file path=ppt/slides/slide38.xml><?xml version="1.0" encoding="utf-8"?>
+<p:sld xmlns:a="http://schemas.openxmlformats.org/drawingml/2006/main" xmlns:r="http://schemas.openxmlformats.org/officeDocument/2006/relationships" xmlns:p="http://schemas.openxmlformats.org/presentationml/2006/main">
+  <p:cSld>
+    <p:spTree>
+      <p:nvGrpSpPr>
+        <p:cNvPr id="1" name="">
+          <a:extLst>
+            <a:ext uri="{FF2B5EF4-FFF2-40B4-BE49-F238E27FC236}">
+              <a16:creationId xmlns:a16="http://schemas.microsoft.com/office/drawing/2014/main" id="{76757AF9-FB18-E902-83E6-51D201908E8C}"/>
+            </a:ext>
+          </a:extLst>
+        </p:cNvPr>
+        <p:cNvGrpSpPr/>
+        <p:nvPr/>
+      </p:nvGrpSpPr>
+      <p:grpSpPr>
+        <a:xfrm>
+          <a:off x="0" y="0"/>
+          <a:ext cx="0" cy="0"/>
+          <a:chOff x="0" y="0"/>
+          <a:chExt cx="0" cy="0"/>
+        </a:xfrm>
+      </p:grpSpPr>
+      <p:sp>
+        <p:nvSpPr>
+          <p:cNvPr id="2" name="Title 1">
+            <a:extLst>
+              <a:ext uri="{FF2B5EF4-FFF2-40B4-BE49-F238E27FC236}">
+                <a16:creationId xmlns:a16="http://schemas.microsoft.com/office/drawing/2014/main" id="{A10AFC92-46DC-4561-AEB6-E56D25894F45}"/>
+              </a:ext>
+            </a:extLst>
+          </p:cNvPr>
+          <p:cNvSpPr>
+            <a:spLocks noGrp="1"/>
+          </p:cNvSpPr>
+          <p:nvPr>
+            <p:ph type="title"/>
+          </p:nvPr>
+        </p:nvSpPr>
+        <p:spPr/>
+        <p:txBody>
+          <a:bodyPr/>
+          <a:lstStyle/>
+          <a:p>
+            <a:r>
+              <a:rPr lang="en-GB" sz="3200" dirty="0">
+                <a:solidFill>
+                  <a:schemeClr val="accent2"/>
+                </a:solidFill>
+              </a:rPr>
+              <a:t>Python </a:t>
+            </a:r>
+            <a:r>
+              <a:rPr lang="en-GB" sz="3200" dirty="0"/>
+              <a:t>– </a:t>
+            </a:r>
+            <a:r>
+              <a:rPr lang="en-GB" dirty="0"/>
+              <a:t> Functions 🧠</a:t>
+            </a:r>
+            <a:br>
+              <a:rPr lang="en-GB" dirty="0"/>
+            </a:br>
+            <a:endParaRPr lang="en-GB" sz="3200" dirty="0"/>
+          </a:p>
+        </p:txBody>
+      </p:sp>
+      <p:sp>
+        <p:nvSpPr>
+          <p:cNvPr id="3" name="Content Placeholder 2">
+            <a:extLst>
+              <a:ext uri="{FF2B5EF4-FFF2-40B4-BE49-F238E27FC236}">
+                <a16:creationId xmlns:a16="http://schemas.microsoft.com/office/drawing/2014/main" id="{EFE89BB4-9EF8-5323-893C-216D9C213419}"/>
+              </a:ext>
+            </a:extLst>
+          </p:cNvPr>
+          <p:cNvSpPr>
+            <a:spLocks noGrp="1"/>
+          </p:cNvSpPr>
+          <p:nvPr>
+            <p:ph sz="quarter" idx="10"/>
+          </p:nvPr>
+        </p:nvSpPr>
+        <p:spPr>
+          <a:xfrm>
+            <a:off x="381001" y="1243584"/>
+            <a:ext cx="11430000" cy="5068317"/>
+          </a:xfrm>
+        </p:spPr>
+        <p:txBody>
+          <a:bodyPr vert="horz" lIns="0" tIns="0" rIns="0" bIns="0" rtlCol="0" anchor="t">
+            <a:noAutofit/>
+          </a:bodyPr>
+          <a:lstStyle/>
+          <a:p>
+            <a:br>
+              <a:rPr lang="en-GB" dirty="0"/>
+            </a:br>
+            <a:endParaRPr lang="en-GB" dirty="0"/>
+          </a:p>
+        </p:txBody>
+      </p:sp>
+      <p:sp>
+        <p:nvSpPr>
+          <p:cNvPr id="4" name="Content Placeholder 2">
+            <a:extLst>
+              <a:ext uri="{FF2B5EF4-FFF2-40B4-BE49-F238E27FC236}">
+                <a16:creationId xmlns:a16="http://schemas.microsoft.com/office/drawing/2014/main" id="{71EE3963-69B2-255A-3F25-A91A3F5394F4}"/>
+              </a:ext>
+            </a:extLst>
+          </p:cNvPr>
+          <p:cNvSpPr txBox="1">
+            <a:spLocks/>
+          </p:cNvSpPr>
+          <p:nvPr/>
+        </p:nvSpPr>
+        <p:spPr>
+          <a:xfrm>
+            <a:off x="319546" y="1103367"/>
+            <a:ext cx="10977716" cy="4876800"/>
+          </a:xfrm>
+          <a:prstGeom prst="rect">
+            <a:avLst/>
+          </a:prstGeom>
+        </p:spPr>
+        <p:txBody>
+          <a:bodyPr/>
+          <a:lstStyle>
+            <a:lvl1pPr marL="0" indent="0" algn="l" defTabSz="228600" rtl="0" eaLnBrk="1" latinLnBrk="0" hangingPunct="1">
+              <a:lnSpc>
+                <a:spcPct val="100000"/>
+              </a:lnSpc>
+              <a:spcBef>
+                <a:spcPts val="0"/>
+              </a:spcBef>
+              <a:spcAft>
+                <a:spcPts val="1200"/>
+              </a:spcAft>
+              <a:buFont typeface="Arial" panose="020B0604020202020204" pitchFamily="34" charset="0"/>
+              <a:buNone/>
+              <a:defRPr sz="2000" b="0" kern="1200">
+                <a:solidFill>
+                  <a:schemeClr val="tx1"/>
+                </a:solidFill>
+                <a:latin typeface="+mn-lt"/>
+                <a:ea typeface="+mn-ea"/>
+                <a:cs typeface="+mn-cs"/>
+              </a:defRPr>
+            </a:lvl1pPr>
+            <a:lvl2pPr marL="228600" indent="-228600" algn="l" defTabSz="228600" rtl="0" eaLnBrk="1" latinLnBrk="0" hangingPunct="1">
+              <a:lnSpc>
+                <a:spcPct val="100000"/>
+              </a:lnSpc>
+              <a:spcBef>
+                <a:spcPts val="0"/>
+              </a:spcBef>
+              <a:spcAft>
+                <a:spcPts val="1200"/>
+              </a:spcAft>
+              <a:buClrTx/>
+              <a:buFont typeface="Arial" panose="020B0604020202020204" pitchFamily="34" charset="0"/>
+              <a:buChar char="•"/>
+              <a:defRPr sz="2000" kern="1200">
+                <a:solidFill>
+                  <a:schemeClr val="tx1"/>
+                </a:solidFill>
+                <a:latin typeface="+mn-lt"/>
+                <a:ea typeface="+mn-ea"/>
+                <a:cs typeface="+mn-cs"/>
+              </a:defRPr>
+            </a:lvl2pPr>
+            <a:lvl3pPr marL="457200" indent="-228600" algn="l" defTabSz="228600" rtl="0" eaLnBrk="1" latinLnBrk="0" hangingPunct="1">
+              <a:lnSpc>
+                <a:spcPct val="100000"/>
+              </a:lnSpc>
+              <a:spcBef>
+                <a:spcPts val="0"/>
+              </a:spcBef>
+              <a:spcAft>
+                <a:spcPts val="1200"/>
+              </a:spcAft>
+              <a:buFont typeface="System Font"/>
+              <a:buChar char="–"/>
+              <a:defRPr sz="2000" kern="1200">
+                <a:solidFill>
+                  <a:schemeClr val="tx1"/>
+                </a:solidFill>
+                <a:latin typeface="+mn-lt"/>
+                <a:ea typeface="+mn-ea"/>
+                <a:cs typeface="+mn-cs"/>
+              </a:defRPr>
+            </a:lvl3pPr>
+            <a:lvl4pPr marL="685800" indent="-228600" algn="l" defTabSz="228600" rtl="0" eaLnBrk="1" latinLnBrk="0" hangingPunct="1">
+              <a:lnSpc>
+                <a:spcPct val="100000"/>
+              </a:lnSpc>
+              <a:spcBef>
+                <a:spcPts val="0"/>
+              </a:spcBef>
+              <a:spcAft>
+                <a:spcPts val="1200"/>
+              </a:spcAft>
+              <a:buFont typeface="Arial" panose="020B0604020202020204" pitchFamily="34" charset="0"/>
+              <a:buChar char="•"/>
+              <a:defRPr sz="1800" kern="1200">
+                <a:solidFill>
+                  <a:schemeClr val="tx1"/>
+                </a:solidFill>
+                <a:latin typeface="+mn-lt"/>
+                <a:ea typeface="+mn-ea"/>
+                <a:cs typeface="+mn-cs"/>
+              </a:defRPr>
+            </a:lvl4pPr>
+            <a:lvl5pPr marL="914400" indent="-228600" algn="l" defTabSz="228600" rtl="0" eaLnBrk="1" latinLnBrk="0" hangingPunct="1">
+              <a:lnSpc>
+                <a:spcPct val="100000"/>
+              </a:lnSpc>
+              <a:spcBef>
+                <a:spcPts val="0"/>
+              </a:spcBef>
+              <a:spcAft>
+                <a:spcPts val="1200"/>
+              </a:spcAft>
+              <a:buFont typeface="System Font"/>
+              <a:buChar char="–"/>
+              <a:defRPr sz="1800" kern="1200">
+                <a:solidFill>
+                  <a:schemeClr val="tx1"/>
+                </a:solidFill>
+                <a:latin typeface="+mn-lt"/>
+                <a:ea typeface="+mn-ea"/>
+                <a:cs typeface="+mn-cs"/>
+              </a:defRPr>
+            </a:lvl5pPr>
+            <a:lvl6pPr marL="11113" indent="0" algn="l" defTabSz="228600" rtl="0" eaLnBrk="1" latinLnBrk="0" hangingPunct="1">
+              <a:lnSpc>
+                <a:spcPct val="90000"/>
+              </a:lnSpc>
+              <a:spcBef>
+                <a:spcPts val="0"/>
+              </a:spcBef>
+              <a:spcAft>
+                <a:spcPts val="1200"/>
+              </a:spcAft>
+              <a:buFont typeface="Graphik" panose="020B0503030202060203" pitchFamily="34" charset="0"/>
+              <a:buNone/>
+              <a:tabLst/>
+              <a:defRPr sz="1600" kern="1200">
+                <a:solidFill>
+                  <a:schemeClr val="tx1"/>
+                </a:solidFill>
+                <a:latin typeface="+mn-lt"/>
+                <a:ea typeface="+mn-ea"/>
+                <a:cs typeface="+mn-cs"/>
+              </a:defRPr>
+            </a:lvl6pPr>
+            <a:lvl7pPr marL="0" indent="0" algn="l" defTabSz="228600" rtl="0" eaLnBrk="1" latinLnBrk="0" hangingPunct="1">
+              <a:lnSpc>
+                <a:spcPct val="90000"/>
+              </a:lnSpc>
+              <a:spcBef>
+                <a:spcPts val="0"/>
+              </a:spcBef>
+              <a:spcAft>
+                <a:spcPts val="1200"/>
+              </a:spcAft>
+              <a:buFont typeface="Arial" panose="020B0604020202020204" pitchFamily="34" charset="0"/>
+              <a:buNone/>
+              <a:defRPr sz="1200" kern="1200">
+                <a:solidFill>
+                  <a:schemeClr val="tx1"/>
+                </a:solidFill>
+                <a:latin typeface="+mn-lt"/>
+                <a:ea typeface="+mn-ea"/>
+                <a:cs typeface="+mn-cs"/>
+              </a:defRPr>
+            </a:lvl7pPr>
+            <a:lvl8pPr marL="0" indent="0" algn="l" defTabSz="228600" rtl="0" eaLnBrk="1" latinLnBrk="0" hangingPunct="1">
+              <a:lnSpc>
+                <a:spcPct val="90000"/>
+              </a:lnSpc>
+              <a:spcBef>
+                <a:spcPts val="0"/>
+              </a:spcBef>
+              <a:spcAft>
+                <a:spcPts val="1200"/>
+              </a:spcAft>
+              <a:buFont typeface="Arial" panose="020B0604020202020204" pitchFamily="34" charset="0"/>
+              <a:buNone/>
+              <a:defRPr sz="1000" b="1" kern="1200">
+                <a:solidFill>
+                  <a:schemeClr val="tx1"/>
+                </a:solidFill>
+                <a:latin typeface="+mn-lt"/>
+                <a:ea typeface="+mn-ea"/>
+                <a:cs typeface="+mn-cs"/>
+              </a:defRPr>
+            </a:lvl8pPr>
+            <a:lvl9pPr marL="0" indent="0" algn="l" defTabSz="228600" rtl="0" eaLnBrk="1" latinLnBrk="0" hangingPunct="1">
+              <a:lnSpc>
+                <a:spcPct val="90000"/>
+              </a:lnSpc>
+              <a:spcBef>
+                <a:spcPts val="0"/>
+              </a:spcBef>
+              <a:spcAft>
+                <a:spcPts val="1200"/>
+              </a:spcAft>
+              <a:buFont typeface="Arial" panose="020B0604020202020204" pitchFamily="34" charset="0"/>
+              <a:buNone/>
+              <a:defRPr sz="800" kern="1200">
+                <a:solidFill>
+                  <a:schemeClr val="tx2"/>
+                </a:solidFill>
+                <a:latin typeface="+mn-lt"/>
+                <a:ea typeface="+mn-ea"/>
+                <a:cs typeface="+mn-cs"/>
+              </a:defRPr>
+            </a:lvl9pPr>
+          </a:lstStyle>
+          <a:p>
+            <a:r>
+              <a:rPr lang="en-GB" b="1" dirty="0"/>
+              <a:t>Functions 🧩</a:t>
+            </a:r>
+          </a:p>
+          <a:p>
+            <a:r>
+              <a:rPr lang="en-GB" b="1" dirty="0"/>
+              <a:t>A function</a:t>
+            </a:r>
+            <a:r>
+              <a:rPr lang="en-GB" dirty="0"/>
+              <a:t> is a named, reusable block of code that accepts inputs (arguments), performs work, and can return a result.</a:t>
+            </a:r>
+          </a:p>
+          <a:p>
+            <a:endParaRPr lang="en-GB" dirty="0"/>
+          </a:p>
+        </p:txBody>
+      </p:sp>
+      <p:pic>
+        <p:nvPicPr>
+          <p:cNvPr id="6" name="Picture 5">
+            <a:extLst>
+              <a:ext uri="{FF2B5EF4-FFF2-40B4-BE49-F238E27FC236}">
+                <a16:creationId xmlns:a16="http://schemas.microsoft.com/office/drawing/2014/main" id="{36898A25-31BF-157E-0C25-5EE4867CF4DE}"/>
+              </a:ext>
+            </a:extLst>
+          </p:cNvPr>
+          <p:cNvPicPr>
+            <a:picLocks noChangeAspect="1"/>
+          </p:cNvPicPr>
+          <p:nvPr/>
+        </p:nvPicPr>
+        <p:blipFill>
+          <a:blip r:embed="rId3"/>
+          <a:stretch>
+            <a:fillRect/>
+          </a:stretch>
+        </p:blipFill>
+        <p:spPr>
+          <a:xfrm>
+            <a:off x="796416" y="2379406"/>
+            <a:ext cx="4050887" cy="4223990"/>
+          </a:xfrm>
+          <a:prstGeom prst="rect">
+            <a:avLst/>
+          </a:prstGeom>
+        </p:spPr>
+      </p:pic>
+    </p:spTree>
+    <p:extLst>
+      <p:ext uri="{BB962C8B-B14F-4D97-AF65-F5344CB8AC3E}">
+        <p14:creationId xmlns:p14="http://schemas.microsoft.com/office/powerpoint/2010/main" val="1931415753"/>
       </p:ext>
     </p:extLst>
   </p:cSld>
@@ -18954,7 +19723,7 @@
 </p:sld>
 </file>
 
-<file path=ppt/slides/slide38.xml><?xml version="1.0" encoding="utf-8"?>
+<file path=ppt/slides/slide39.xml><?xml version="1.0" encoding="utf-8"?>
 <p:sld xmlns:a="http://schemas.openxmlformats.org/drawingml/2006/main" xmlns:r="http://schemas.openxmlformats.org/officeDocument/2006/relationships" xmlns:p="http://schemas.openxmlformats.org/presentationml/2006/main">
   <p:cSld>
     <p:spTree>
@@ -19012,7 +19781,7 @@
             </a:r>
             <a:r>
               <a:rPr lang="en-GB" dirty="0"/>
-              <a:t> Functions &amp; Imports 🧠</a:t>
+              <a:t> Imports 🧠</a:t>
             </a:r>
             <a:br>
               <a:rPr lang="en-GB" dirty="0"/>
@@ -19275,159 +20044,24 @@
             </a:lvl9pPr>
           </a:lstStyle>
           <a:p>
-            <a:pPr marL="285750" indent="-285750">
-              <a:buFont typeface="Arial" panose="020B0604020202020204" pitchFamily="34" charset="0"/>
-              <a:buChar char="•"/>
-              <a:defRPr sz="1400"/>
-            </a:pPr>
-            <a:r>
-              <a:rPr lang="en-GB" sz="1400" dirty="0"/>
-              <a:t>Functions package reusable logic. Modules let you reuse code across files. Use docstrings and clear parameter names for readability.</a:t>
-            </a:r>
-          </a:p>
-          <a:p>
-            <a:pPr marL="285750" indent="-285750">
-              <a:buFont typeface="Arial" panose="020B0604020202020204" pitchFamily="34" charset="0"/>
-              <a:buChar char="•"/>
-              <a:defRPr sz="1400"/>
-            </a:pPr>
-            <a:r>
-              <a:rPr lang="en-GB" sz="1400" dirty="0"/>
-              <a:t>Defining : def greet(name): — use a docstring to explain purpose</a:t>
-            </a:r>
-          </a:p>
-          <a:p>
-            <a:pPr marL="285750" indent="-285750">
-              <a:buFont typeface="Arial" panose="020B0604020202020204" pitchFamily="34" charset="0"/>
-              <a:buChar char="•"/>
-              <a:defRPr sz="1400"/>
-            </a:pPr>
-            <a:r>
-              <a:rPr lang="en-GB" sz="1400" dirty="0"/>
-              <a:t>Parameters : positional, default, *</a:t>
-            </a:r>
-            <a:r>
-              <a:rPr lang="en-GB" sz="1400" dirty="0" err="1"/>
-              <a:t>args</a:t>
-            </a:r>
-            <a:r>
-              <a:rPr lang="en-GB" sz="1400" dirty="0"/>
-              <a:t> , **</a:t>
-            </a:r>
-            <a:r>
-              <a:rPr lang="en-GB" sz="1400" dirty="0" err="1"/>
-              <a:t>kwargs</a:t>
-            </a:r>
-            <a:endParaRPr lang="en-GB" sz="1400" dirty="0"/>
-          </a:p>
-          <a:p>
-            <a:pPr marL="285750" indent="-285750">
-              <a:buFont typeface="Arial" panose="020B0604020202020204" pitchFamily="34" charset="0"/>
-              <a:buChar char="•"/>
-              <a:defRPr sz="1400"/>
-            </a:pPr>
-            <a:r>
-              <a:rPr lang="en-GB" sz="1400" dirty="0"/>
-              <a:t>Return : functions should return values when appropriate</a:t>
-            </a:r>
-          </a:p>
-          <a:p>
-            <a:pPr>
-              <a:defRPr sz="1400"/>
-            </a:pPr>
-            <a:r>
-              <a:rPr lang="en-GB" sz="1400" dirty="0"/>
-              <a:t>def add(a, b=0):</a:t>
-            </a:r>
-          </a:p>
-          <a:p>
-            <a:pPr>
-              <a:defRPr sz="1400"/>
-            </a:pPr>
-            <a:r>
-              <a:rPr lang="en-GB" sz="1400" dirty="0"/>
-              <a:t>    """Return sum of two numbers"""</a:t>
-            </a:r>
-          </a:p>
-          <a:p>
-            <a:pPr>
-              <a:defRPr sz="1400"/>
-            </a:pPr>
-            <a:r>
-              <a:rPr lang="en-GB" sz="1400" dirty="0"/>
-              <a:t>    return a + b</a:t>
-            </a:r>
-          </a:p>
-          <a:p>
-            <a:pPr marL="285750" indent="-285750">
-              <a:buFont typeface="Arial" panose="020B0604020202020204" pitchFamily="34" charset="0"/>
-              <a:buChar char="•"/>
-              <a:defRPr sz="1400"/>
-            </a:pPr>
-            <a:endParaRPr lang="en-GB" sz="1400" dirty="0"/>
-          </a:p>
-          <a:p>
-            <a:pPr marL="285750" indent="-285750">
-              <a:buFont typeface="Arial" panose="020B0604020202020204" pitchFamily="34" charset="0"/>
-              <a:buChar char="•"/>
-              <a:defRPr sz="1400"/>
-            </a:pPr>
-            <a:r>
-              <a:rPr lang="en-GB" sz="1400" dirty="0"/>
-              <a:t>Imports : import </a:t>
-            </a:r>
-            <a:r>
-              <a:rPr lang="en-GB" sz="1400" dirty="0" err="1"/>
-              <a:t>os</a:t>
-            </a:r>
-            <a:r>
-              <a:rPr lang="en-GB" sz="1400" dirty="0"/>
-              <a:t> , from </a:t>
-            </a:r>
-            <a:r>
-              <a:rPr lang="en-GB" sz="1400" dirty="0" err="1"/>
-              <a:t>dotenv</a:t>
-            </a:r>
-            <a:r>
-              <a:rPr lang="en-GB" sz="1400" dirty="0"/>
-              <a:t> import </a:t>
-            </a:r>
-            <a:r>
-              <a:rPr lang="en-GB" sz="1400" dirty="0" err="1"/>
-              <a:t>load_dotenv</a:t>
-            </a:r>
-            <a:r>
-              <a:rPr lang="en-GB" sz="1400" dirty="0"/>
-              <a:t> — keep imports at top of file</a:t>
-            </a:r>
-          </a:p>
-          <a:p>
-            <a:pPr marL="285750" indent="-285750">
-              <a:buFont typeface="Arial" panose="020B0604020202020204" pitchFamily="34" charset="0"/>
-              <a:buChar char="•"/>
-              <a:defRPr sz="1400"/>
-            </a:pPr>
-            <a:r>
-              <a:rPr lang="en-GB" sz="1400" dirty="0"/>
-              <a:t># Import example</a:t>
-            </a:r>
-          </a:p>
-          <a:p>
-            <a:pPr>
-              <a:defRPr sz="1400"/>
-            </a:pPr>
-            <a:r>
-              <a:rPr lang="en-GB" sz="1400" dirty="0"/>
-              <a:t>from math import sqrt</a:t>
-            </a:r>
-          </a:p>
-          <a:p>
-            <a:pPr>
-              <a:defRPr sz="1400"/>
-            </a:pPr>
-            <a:r>
-              <a:rPr lang="en-GB" sz="1400" dirty="0"/>
-              <a:t>print(sqrt(9))</a:t>
+            <a:r>
+              <a:rPr lang="en-GB" b="1" dirty="0"/>
+              <a:t>What is import in Python? 🔧</a:t>
+            </a:r>
+          </a:p>
+          <a:p>
+            <a:r>
+              <a:rPr lang="en-GB" dirty="0"/>
+              <a:t>import brings code (functions, classes, variables) from another module into your current file so you can reuse it.</a:t>
+            </a:r>
+          </a:p>
+          <a:p>
+            <a:endParaRPr lang="en-GB" dirty="0"/>
+          </a:p>
+          <a:p>
+            <a:r>
+              <a:rPr lang="en-GB" dirty="0"/>
+              <a:t>	</a:t>
             </a:r>
           </a:p>
           <a:p>
@@ -19438,6 +20072,36 @@
           </a:p>
         </p:txBody>
       </p:sp>
+      <p:pic>
+        <p:nvPicPr>
+          <p:cNvPr id="6" name="Picture 5">
+            <a:extLst>
+              <a:ext uri="{FF2B5EF4-FFF2-40B4-BE49-F238E27FC236}">
+                <a16:creationId xmlns:a16="http://schemas.microsoft.com/office/drawing/2014/main" id="{A67C36DB-C091-318C-8338-E55EB0EADCAD}"/>
+              </a:ext>
+            </a:extLst>
+          </p:cNvPr>
+          <p:cNvPicPr>
+            <a:picLocks noChangeAspect="1"/>
+          </p:cNvPicPr>
+          <p:nvPr/>
+        </p:nvPicPr>
+        <p:blipFill>
+          <a:blip r:embed="rId3"/>
+          <a:stretch>
+            <a:fillRect/>
+          </a:stretch>
+        </p:blipFill>
+        <p:spPr>
+          <a:xfrm>
+            <a:off x="804864" y="2647910"/>
+            <a:ext cx="3619652" cy="2900438"/>
+          </a:xfrm>
+          <a:prstGeom prst="rect">
+            <a:avLst/>
+          </a:prstGeom>
+        </p:spPr>
+      </p:pic>
     </p:spTree>
     <p:extLst>
       <p:ext uri="{BB962C8B-B14F-4D97-AF65-F5344CB8AC3E}">
@@ -19448,414 +20112,13 @@
   <p:clrMapOvr>
     <a:masterClrMapping/>
   </p:clrMapOvr>
-  <mc:AlternateContent xmlns:mc="http://schemas.openxmlformats.org/markup-compatibility/2006">
-    <mc:Choice xmlns:p14="http://schemas.microsoft.com/office/powerpoint/2010/main" Requires="p14">
+  <mc:AlternateContent xmlns:mc="http://schemas.openxmlformats.org/markup-compatibility/2006" xmlns:p14="http://schemas.microsoft.com/office/powerpoint/2010/main">
+    <mc:Choice Requires="p14">
       <p:transition spd="med" p14:dur="700">
         <p:fade/>
       </p:transition>
     </mc:Choice>
-    <mc:Fallback>
-      <p:transition spd="med">
-        <p:fade/>
-      </p:transition>
-    </mc:Fallback>
-  </mc:AlternateContent>
-</p:sld>
-</file>
-
-<file path=ppt/slides/slide39.xml><?xml version="1.0" encoding="utf-8"?>
-<p:sld xmlns:a="http://schemas.openxmlformats.org/drawingml/2006/main" xmlns:r="http://schemas.openxmlformats.org/officeDocument/2006/relationships" xmlns:p="http://schemas.openxmlformats.org/presentationml/2006/main">
-  <p:cSld>
-    <p:spTree>
-      <p:nvGrpSpPr>
-        <p:cNvPr id="1" name="">
-          <a:extLst>
-            <a:ext uri="{FF2B5EF4-FFF2-40B4-BE49-F238E27FC236}">
-              <a16:creationId xmlns:a16="http://schemas.microsoft.com/office/drawing/2014/main" id="{A661660F-27D2-8E0E-22C9-BF0E94F5C906}"/>
-            </a:ext>
-          </a:extLst>
-        </p:cNvPr>
-        <p:cNvGrpSpPr/>
-        <p:nvPr/>
-      </p:nvGrpSpPr>
-      <p:grpSpPr>
-        <a:xfrm>
-          <a:off x="0" y="0"/>
-          <a:ext cx="0" cy="0"/>
-          <a:chOff x="0" y="0"/>
-          <a:chExt cx="0" cy="0"/>
-        </a:xfrm>
-      </p:grpSpPr>
-      <p:sp>
-        <p:nvSpPr>
-          <p:cNvPr id="2" name="Title 1">
-            <a:extLst>
-              <a:ext uri="{FF2B5EF4-FFF2-40B4-BE49-F238E27FC236}">
-                <a16:creationId xmlns:a16="http://schemas.microsoft.com/office/drawing/2014/main" id="{AA314D9D-6209-62FB-2A1A-3B9B28311732}"/>
-              </a:ext>
-            </a:extLst>
-          </p:cNvPr>
-          <p:cNvSpPr>
-            <a:spLocks noGrp="1"/>
-          </p:cNvSpPr>
-          <p:nvPr>
-            <p:ph type="title"/>
-          </p:nvPr>
-        </p:nvSpPr>
-        <p:spPr/>
-        <p:txBody>
-          <a:bodyPr/>
-          <a:lstStyle/>
-          <a:p>
-            <a:r>
-              <a:rPr lang="en-GB" sz="3200" dirty="0">
-                <a:solidFill>
-                  <a:schemeClr val="accent2"/>
-                </a:solidFill>
-              </a:rPr>
-              <a:t>Python </a:t>
-            </a:r>
-            <a:r>
-              <a:rPr lang="en-GB" sz="3200" dirty="0"/>
-              <a:t>– </a:t>
-            </a:r>
-            <a:r>
-              <a:rPr lang="en-GB" dirty="0"/>
-              <a:t> Code Walkthrough:</a:t>
-            </a:r>
-            <a:br>
-              <a:rPr lang="en-GB" dirty="0"/>
-            </a:br>
-            <a:r>
-              <a:rPr lang="en-GB" sz="3200" dirty="0"/>
-              <a:t>Read the Files  Quick Guide 📄</a:t>
-            </a:r>
-          </a:p>
-        </p:txBody>
-      </p:sp>
-      <p:sp>
-        <p:nvSpPr>
-          <p:cNvPr id="3" name="Content Placeholder 2">
-            <a:extLst>
-              <a:ext uri="{FF2B5EF4-FFF2-40B4-BE49-F238E27FC236}">
-                <a16:creationId xmlns:a16="http://schemas.microsoft.com/office/drawing/2014/main" id="{D61BA5FF-8964-B150-AD28-903624461028}"/>
-              </a:ext>
-            </a:extLst>
-          </p:cNvPr>
-          <p:cNvSpPr>
-            <a:spLocks noGrp="1"/>
-          </p:cNvSpPr>
-          <p:nvPr>
-            <p:ph sz="quarter" idx="10"/>
-          </p:nvPr>
-        </p:nvSpPr>
-        <p:spPr>
-          <a:xfrm>
-            <a:off x="381001" y="1243584"/>
-            <a:ext cx="11430000" cy="5068317"/>
-          </a:xfrm>
-        </p:spPr>
-        <p:txBody>
-          <a:bodyPr vert="horz" lIns="0" tIns="0" rIns="0" bIns="0" rtlCol="0" anchor="t">
-            <a:noAutofit/>
-          </a:bodyPr>
-          <a:lstStyle/>
-          <a:p>
-            <a:pPr>
-              <a:defRPr sz="1400"/>
-            </a:pPr>
-            <a:br>
-              <a:rPr lang="en-GB" dirty="0"/>
-            </a:br>
-            <a:r>
-              <a:rPr lang="en-GB" dirty="0"/>
-              <a:t>final-code/config.py</a:t>
-            </a:r>
-          </a:p>
-          <a:p>
-            <a:pPr>
-              <a:defRPr sz="1400"/>
-            </a:pPr>
-            <a:r>
-              <a:rPr lang="en-GB" dirty="0"/>
-              <a:t>Loads env and checks GOOGLE_API_KEY</a:t>
-            </a:r>
-          </a:p>
-          <a:p>
-            <a:pPr>
-              <a:defRPr sz="1400"/>
-            </a:pPr>
-            <a:r>
-              <a:rPr lang="en-GB" dirty="0"/>
-              <a:t>Raises an error if it's missing (helps students debug setup quickly)</a:t>
-            </a:r>
-          </a:p>
-          <a:p>
-            <a:pPr>
-              <a:defRPr sz="1400"/>
-            </a:pPr>
-            <a:r>
-              <a:rPr lang="en-GB" dirty="0"/>
-              <a:t>Simple, commented Flask app that demonstrates endpoints and calling an external API</a:t>
-            </a:r>
-          </a:p>
-          <a:p>
-            <a:pPr>
-              <a:defRPr sz="1400"/>
-            </a:pPr>
-            <a:r>
-              <a:rPr lang="en-GB" dirty="0"/>
-              <a:t>Readable: clear variable names, safe defaults, and short prompt builder</a:t>
-            </a:r>
-          </a:p>
-          <a:p>
-            <a:endParaRPr lang="en-GB" dirty="0"/>
-          </a:p>
-        </p:txBody>
-      </p:sp>
-      <p:sp>
-        <p:nvSpPr>
-          <p:cNvPr id="4" name="Content Placeholder 2">
-            <a:extLst>
-              <a:ext uri="{FF2B5EF4-FFF2-40B4-BE49-F238E27FC236}">
-                <a16:creationId xmlns:a16="http://schemas.microsoft.com/office/drawing/2014/main" id="{DDCFADCE-98BF-A031-9FA2-B20AA217480E}"/>
-              </a:ext>
-            </a:extLst>
-          </p:cNvPr>
-          <p:cNvSpPr txBox="1">
-            <a:spLocks/>
-          </p:cNvSpPr>
-          <p:nvPr/>
-        </p:nvSpPr>
-        <p:spPr>
-          <a:xfrm>
-            <a:off x="380999" y="1339342"/>
-            <a:ext cx="10977716" cy="4876800"/>
-          </a:xfrm>
-          <a:prstGeom prst="rect">
-            <a:avLst/>
-          </a:prstGeom>
-        </p:spPr>
-        <p:txBody>
-          <a:bodyPr/>
-          <a:lstStyle>
-            <a:lvl1pPr marL="0" indent="0" algn="l" defTabSz="228600" rtl="0" eaLnBrk="1" latinLnBrk="0" hangingPunct="1">
-              <a:lnSpc>
-                <a:spcPct val="100000"/>
-              </a:lnSpc>
-              <a:spcBef>
-                <a:spcPts val="0"/>
-              </a:spcBef>
-              <a:spcAft>
-                <a:spcPts val="1200"/>
-              </a:spcAft>
-              <a:buFont typeface="Arial" panose="020B0604020202020204" pitchFamily="34" charset="0"/>
-              <a:buNone/>
-              <a:defRPr sz="2000" b="0" kern="1200">
-                <a:solidFill>
-                  <a:schemeClr val="tx1"/>
-                </a:solidFill>
-                <a:latin typeface="+mn-lt"/>
-                <a:ea typeface="+mn-ea"/>
-                <a:cs typeface="+mn-cs"/>
-              </a:defRPr>
-            </a:lvl1pPr>
-            <a:lvl2pPr marL="228600" indent="-228600" algn="l" defTabSz="228600" rtl="0" eaLnBrk="1" latinLnBrk="0" hangingPunct="1">
-              <a:lnSpc>
-                <a:spcPct val="100000"/>
-              </a:lnSpc>
-              <a:spcBef>
-                <a:spcPts val="0"/>
-              </a:spcBef>
-              <a:spcAft>
-                <a:spcPts val="1200"/>
-              </a:spcAft>
-              <a:buClrTx/>
-              <a:buFont typeface="Arial" panose="020B0604020202020204" pitchFamily="34" charset="0"/>
-              <a:buChar char="•"/>
-              <a:defRPr sz="2000" kern="1200">
-                <a:solidFill>
-                  <a:schemeClr val="tx1"/>
-                </a:solidFill>
-                <a:latin typeface="+mn-lt"/>
-                <a:ea typeface="+mn-ea"/>
-                <a:cs typeface="+mn-cs"/>
-              </a:defRPr>
-            </a:lvl2pPr>
-            <a:lvl3pPr marL="457200" indent="-228600" algn="l" defTabSz="228600" rtl="0" eaLnBrk="1" latinLnBrk="0" hangingPunct="1">
-              <a:lnSpc>
-                <a:spcPct val="100000"/>
-              </a:lnSpc>
-              <a:spcBef>
-                <a:spcPts val="0"/>
-              </a:spcBef>
-              <a:spcAft>
-                <a:spcPts val="1200"/>
-              </a:spcAft>
-              <a:buFont typeface="System Font"/>
-              <a:buChar char="–"/>
-              <a:defRPr sz="2000" kern="1200">
-                <a:solidFill>
-                  <a:schemeClr val="tx1"/>
-                </a:solidFill>
-                <a:latin typeface="+mn-lt"/>
-                <a:ea typeface="+mn-ea"/>
-                <a:cs typeface="+mn-cs"/>
-              </a:defRPr>
-            </a:lvl3pPr>
-            <a:lvl4pPr marL="685800" indent="-228600" algn="l" defTabSz="228600" rtl="0" eaLnBrk="1" latinLnBrk="0" hangingPunct="1">
-              <a:lnSpc>
-                <a:spcPct val="100000"/>
-              </a:lnSpc>
-              <a:spcBef>
-                <a:spcPts val="0"/>
-              </a:spcBef>
-              <a:spcAft>
-                <a:spcPts val="1200"/>
-              </a:spcAft>
-              <a:buFont typeface="Arial" panose="020B0604020202020204" pitchFamily="34" charset="0"/>
-              <a:buChar char="•"/>
-              <a:defRPr sz="1800" kern="1200">
-                <a:solidFill>
-                  <a:schemeClr val="tx1"/>
-                </a:solidFill>
-                <a:latin typeface="+mn-lt"/>
-                <a:ea typeface="+mn-ea"/>
-                <a:cs typeface="+mn-cs"/>
-              </a:defRPr>
-            </a:lvl4pPr>
-            <a:lvl5pPr marL="914400" indent="-228600" algn="l" defTabSz="228600" rtl="0" eaLnBrk="1" latinLnBrk="0" hangingPunct="1">
-              <a:lnSpc>
-                <a:spcPct val="100000"/>
-              </a:lnSpc>
-              <a:spcBef>
-                <a:spcPts val="0"/>
-              </a:spcBef>
-              <a:spcAft>
-                <a:spcPts val="1200"/>
-              </a:spcAft>
-              <a:buFont typeface="System Font"/>
-              <a:buChar char="–"/>
-              <a:defRPr sz="1800" kern="1200">
-                <a:solidFill>
-                  <a:schemeClr val="tx1"/>
-                </a:solidFill>
-                <a:latin typeface="+mn-lt"/>
-                <a:ea typeface="+mn-ea"/>
-                <a:cs typeface="+mn-cs"/>
-              </a:defRPr>
-            </a:lvl5pPr>
-            <a:lvl6pPr marL="11113" indent="0" algn="l" defTabSz="228600" rtl="0" eaLnBrk="1" latinLnBrk="0" hangingPunct="1">
-              <a:lnSpc>
-                <a:spcPct val="90000"/>
-              </a:lnSpc>
-              <a:spcBef>
-                <a:spcPts val="0"/>
-              </a:spcBef>
-              <a:spcAft>
-                <a:spcPts val="1200"/>
-              </a:spcAft>
-              <a:buFont typeface="Graphik" panose="020B0503030202060203" pitchFamily="34" charset="0"/>
-              <a:buNone/>
-              <a:tabLst/>
-              <a:defRPr sz="1600" kern="1200">
-                <a:solidFill>
-                  <a:schemeClr val="tx1"/>
-                </a:solidFill>
-                <a:latin typeface="+mn-lt"/>
-                <a:ea typeface="+mn-ea"/>
-                <a:cs typeface="+mn-cs"/>
-              </a:defRPr>
-            </a:lvl6pPr>
-            <a:lvl7pPr marL="0" indent="0" algn="l" defTabSz="228600" rtl="0" eaLnBrk="1" latinLnBrk="0" hangingPunct="1">
-              <a:lnSpc>
-                <a:spcPct val="90000"/>
-              </a:lnSpc>
-              <a:spcBef>
-                <a:spcPts val="0"/>
-              </a:spcBef>
-              <a:spcAft>
-                <a:spcPts val="1200"/>
-              </a:spcAft>
-              <a:buFont typeface="Arial" panose="020B0604020202020204" pitchFamily="34" charset="0"/>
-              <a:buNone/>
-              <a:defRPr sz="1200" kern="1200">
-                <a:solidFill>
-                  <a:schemeClr val="tx1"/>
-                </a:solidFill>
-                <a:latin typeface="+mn-lt"/>
-                <a:ea typeface="+mn-ea"/>
-                <a:cs typeface="+mn-cs"/>
-              </a:defRPr>
-            </a:lvl7pPr>
-            <a:lvl8pPr marL="0" indent="0" algn="l" defTabSz="228600" rtl="0" eaLnBrk="1" latinLnBrk="0" hangingPunct="1">
-              <a:lnSpc>
-                <a:spcPct val="90000"/>
-              </a:lnSpc>
-              <a:spcBef>
-                <a:spcPts val="0"/>
-              </a:spcBef>
-              <a:spcAft>
-                <a:spcPts val="1200"/>
-              </a:spcAft>
-              <a:buFont typeface="Arial" panose="020B0604020202020204" pitchFamily="34" charset="0"/>
-              <a:buNone/>
-              <a:defRPr sz="1000" b="1" kern="1200">
-                <a:solidFill>
-                  <a:schemeClr val="tx1"/>
-                </a:solidFill>
-                <a:latin typeface="+mn-lt"/>
-                <a:ea typeface="+mn-ea"/>
-                <a:cs typeface="+mn-cs"/>
-              </a:defRPr>
-            </a:lvl8pPr>
-            <a:lvl9pPr marL="0" indent="0" algn="l" defTabSz="228600" rtl="0" eaLnBrk="1" latinLnBrk="0" hangingPunct="1">
-              <a:lnSpc>
-                <a:spcPct val="90000"/>
-              </a:lnSpc>
-              <a:spcBef>
-                <a:spcPts val="0"/>
-              </a:spcBef>
-              <a:spcAft>
-                <a:spcPts val="1200"/>
-              </a:spcAft>
-              <a:buFont typeface="Arial" panose="020B0604020202020204" pitchFamily="34" charset="0"/>
-              <a:buNone/>
-              <a:defRPr sz="800" kern="1200">
-                <a:solidFill>
-                  <a:schemeClr val="tx2"/>
-                </a:solidFill>
-                <a:latin typeface="+mn-lt"/>
-                <a:ea typeface="+mn-ea"/>
-                <a:cs typeface="+mn-cs"/>
-              </a:defRPr>
-            </a:lvl9pPr>
-          </a:lstStyle>
-          <a:p>
-            <a:pPr>
-              <a:defRPr sz="1400"/>
-            </a:pPr>
-            <a:endParaRPr lang="en-GB" sz="1400" dirty="0"/>
-          </a:p>
-        </p:txBody>
-      </p:sp>
-    </p:spTree>
-    <p:extLst>
-      <p:ext uri="{BB962C8B-B14F-4D97-AF65-F5344CB8AC3E}">
-        <p14:creationId xmlns:p14="http://schemas.microsoft.com/office/powerpoint/2010/main" val="1834763470"/>
-      </p:ext>
-    </p:extLst>
-  </p:cSld>
-  <p:clrMapOvr>
-    <a:masterClrMapping/>
-  </p:clrMapOvr>
-  <mc:AlternateContent xmlns:mc="http://schemas.openxmlformats.org/markup-compatibility/2006">
-    <mc:Choice xmlns:p14="http://schemas.microsoft.com/office/powerpoint/2010/main" Requires="p14">
-      <p:transition spd="med" p14:dur="700">
-        <p:fade/>
-      </p:transition>
-    </mc:Choice>
-    <mc:Fallback>
+    <mc:Fallback xmlns="">
       <p:transition spd="med">
         <p:fade/>
       </p:transition>
@@ -20582,6 +20845,1792 @@
       </p:transition>
     </mc:Choice>
     <mc:Fallback xmlns="">
+      <p:transition spd="med">
+        <p:fade/>
+      </p:transition>
+    </mc:Fallback>
+  </mc:AlternateContent>
+</p:sld>
+</file>
+
+<file path=ppt/slides/slide40.xml><?xml version="1.0" encoding="utf-8"?>
+<p:sld xmlns:a="http://schemas.openxmlformats.org/drawingml/2006/main" xmlns:r="http://schemas.openxmlformats.org/officeDocument/2006/relationships" xmlns:p="http://schemas.openxmlformats.org/presentationml/2006/main">
+  <p:cSld>
+    <p:spTree>
+      <p:nvGrpSpPr>
+        <p:cNvPr id="1" name="">
+          <a:extLst>
+            <a:ext uri="{FF2B5EF4-FFF2-40B4-BE49-F238E27FC236}">
+              <a16:creationId xmlns:a16="http://schemas.microsoft.com/office/drawing/2014/main" id="{A661660F-27D2-8E0E-22C9-BF0E94F5C906}"/>
+            </a:ext>
+          </a:extLst>
+        </p:cNvPr>
+        <p:cNvGrpSpPr/>
+        <p:nvPr/>
+      </p:nvGrpSpPr>
+      <p:grpSpPr>
+        <a:xfrm>
+          <a:off x="0" y="0"/>
+          <a:ext cx="0" cy="0"/>
+          <a:chOff x="0" y="0"/>
+          <a:chExt cx="0" cy="0"/>
+        </a:xfrm>
+      </p:grpSpPr>
+      <p:sp>
+        <p:nvSpPr>
+          <p:cNvPr id="2" name="Title 1">
+            <a:extLst>
+              <a:ext uri="{FF2B5EF4-FFF2-40B4-BE49-F238E27FC236}">
+                <a16:creationId xmlns:a16="http://schemas.microsoft.com/office/drawing/2014/main" id="{AA314D9D-6209-62FB-2A1A-3B9B28311732}"/>
+              </a:ext>
+            </a:extLst>
+          </p:cNvPr>
+          <p:cNvSpPr>
+            <a:spLocks noGrp="1"/>
+          </p:cNvSpPr>
+          <p:nvPr>
+            <p:ph type="title"/>
+          </p:nvPr>
+        </p:nvSpPr>
+        <p:spPr/>
+        <p:txBody>
+          <a:bodyPr/>
+          <a:lstStyle/>
+          <a:p>
+            <a:r>
+              <a:rPr lang="en-GB" sz="3200" dirty="0">
+                <a:solidFill>
+                  <a:schemeClr val="accent2"/>
+                </a:solidFill>
+              </a:rPr>
+              <a:t>Python </a:t>
+            </a:r>
+            <a:r>
+              <a:rPr lang="en-GB" sz="3200" dirty="0"/>
+              <a:t>– </a:t>
+            </a:r>
+            <a:r>
+              <a:rPr lang="en-GB" dirty="0"/>
+              <a:t> Code </a:t>
+            </a:r>
+            <a:r>
+              <a:rPr lang="en-GB"/>
+              <a:t>Walkthrough: </a:t>
+            </a:r>
+            <a:r>
+              <a:rPr lang="en-GB" sz="3200"/>
+              <a:t>Quick </a:t>
+            </a:r>
+            <a:r>
+              <a:rPr lang="en-GB" sz="3200" dirty="0"/>
+              <a:t>Guide 📄</a:t>
+            </a:r>
+          </a:p>
+        </p:txBody>
+      </p:sp>
+      <p:sp>
+        <p:nvSpPr>
+          <p:cNvPr id="3" name="Content Placeholder 2">
+            <a:extLst>
+              <a:ext uri="{FF2B5EF4-FFF2-40B4-BE49-F238E27FC236}">
+                <a16:creationId xmlns:a16="http://schemas.microsoft.com/office/drawing/2014/main" id="{D61BA5FF-8964-B150-AD28-903624461028}"/>
+              </a:ext>
+            </a:extLst>
+          </p:cNvPr>
+          <p:cNvSpPr>
+            <a:spLocks noGrp="1"/>
+          </p:cNvSpPr>
+          <p:nvPr>
+            <p:ph sz="quarter" idx="10"/>
+          </p:nvPr>
+        </p:nvSpPr>
+        <p:spPr>
+          <a:xfrm>
+            <a:off x="381001" y="1243584"/>
+            <a:ext cx="11430000" cy="5068317"/>
+          </a:xfrm>
+        </p:spPr>
+        <p:txBody>
+          <a:bodyPr vert="horz" lIns="0" tIns="0" rIns="0" bIns="0" rtlCol="0" anchor="t">
+            <a:noAutofit/>
+          </a:bodyPr>
+          <a:lstStyle/>
+          <a:p>
+            <a:pPr>
+              <a:defRPr sz="1400"/>
+            </a:pPr>
+            <a:br>
+              <a:rPr lang="en-GB" dirty="0"/>
+            </a:br>
+            <a:endParaRPr lang="en-GB" dirty="0"/>
+          </a:p>
+        </p:txBody>
+      </p:sp>
+      <p:sp>
+        <p:nvSpPr>
+          <p:cNvPr id="4" name="Content Placeholder 2">
+            <a:extLst>
+              <a:ext uri="{FF2B5EF4-FFF2-40B4-BE49-F238E27FC236}">
+                <a16:creationId xmlns:a16="http://schemas.microsoft.com/office/drawing/2014/main" id="{DDCFADCE-98BF-A031-9FA2-B20AA217480E}"/>
+              </a:ext>
+            </a:extLst>
+          </p:cNvPr>
+          <p:cNvSpPr txBox="1">
+            <a:spLocks/>
+          </p:cNvSpPr>
+          <p:nvPr/>
+        </p:nvSpPr>
+        <p:spPr>
+          <a:xfrm>
+            <a:off x="380999" y="1339342"/>
+            <a:ext cx="10977716" cy="4876800"/>
+          </a:xfrm>
+          <a:prstGeom prst="rect">
+            <a:avLst/>
+          </a:prstGeom>
+        </p:spPr>
+        <p:txBody>
+          <a:bodyPr/>
+          <a:lstStyle>
+            <a:lvl1pPr marL="0" indent="0" algn="l" defTabSz="228600" rtl="0" eaLnBrk="1" latinLnBrk="0" hangingPunct="1">
+              <a:lnSpc>
+                <a:spcPct val="100000"/>
+              </a:lnSpc>
+              <a:spcBef>
+                <a:spcPts val="0"/>
+              </a:spcBef>
+              <a:spcAft>
+                <a:spcPts val="1200"/>
+              </a:spcAft>
+              <a:buFont typeface="Arial" panose="020B0604020202020204" pitchFamily="34" charset="0"/>
+              <a:buNone/>
+              <a:defRPr sz="2000" b="0" kern="1200">
+                <a:solidFill>
+                  <a:schemeClr val="tx1"/>
+                </a:solidFill>
+                <a:latin typeface="+mn-lt"/>
+                <a:ea typeface="+mn-ea"/>
+                <a:cs typeface="+mn-cs"/>
+              </a:defRPr>
+            </a:lvl1pPr>
+            <a:lvl2pPr marL="228600" indent="-228600" algn="l" defTabSz="228600" rtl="0" eaLnBrk="1" latinLnBrk="0" hangingPunct="1">
+              <a:lnSpc>
+                <a:spcPct val="100000"/>
+              </a:lnSpc>
+              <a:spcBef>
+                <a:spcPts val="0"/>
+              </a:spcBef>
+              <a:spcAft>
+                <a:spcPts val="1200"/>
+              </a:spcAft>
+              <a:buClrTx/>
+              <a:buFont typeface="Arial" panose="020B0604020202020204" pitchFamily="34" charset="0"/>
+              <a:buChar char="•"/>
+              <a:defRPr sz="2000" kern="1200">
+                <a:solidFill>
+                  <a:schemeClr val="tx1"/>
+                </a:solidFill>
+                <a:latin typeface="+mn-lt"/>
+                <a:ea typeface="+mn-ea"/>
+                <a:cs typeface="+mn-cs"/>
+              </a:defRPr>
+            </a:lvl2pPr>
+            <a:lvl3pPr marL="457200" indent="-228600" algn="l" defTabSz="228600" rtl="0" eaLnBrk="1" latinLnBrk="0" hangingPunct="1">
+              <a:lnSpc>
+                <a:spcPct val="100000"/>
+              </a:lnSpc>
+              <a:spcBef>
+                <a:spcPts val="0"/>
+              </a:spcBef>
+              <a:spcAft>
+                <a:spcPts val="1200"/>
+              </a:spcAft>
+              <a:buFont typeface="System Font"/>
+              <a:buChar char="–"/>
+              <a:defRPr sz="2000" kern="1200">
+                <a:solidFill>
+                  <a:schemeClr val="tx1"/>
+                </a:solidFill>
+                <a:latin typeface="+mn-lt"/>
+                <a:ea typeface="+mn-ea"/>
+                <a:cs typeface="+mn-cs"/>
+              </a:defRPr>
+            </a:lvl3pPr>
+            <a:lvl4pPr marL="685800" indent="-228600" algn="l" defTabSz="228600" rtl="0" eaLnBrk="1" latinLnBrk="0" hangingPunct="1">
+              <a:lnSpc>
+                <a:spcPct val="100000"/>
+              </a:lnSpc>
+              <a:spcBef>
+                <a:spcPts val="0"/>
+              </a:spcBef>
+              <a:spcAft>
+                <a:spcPts val="1200"/>
+              </a:spcAft>
+              <a:buFont typeface="Arial" panose="020B0604020202020204" pitchFamily="34" charset="0"/>
+              <a:buChar char="•"/>
+              <a:defRPr sz="1800" kern="1200">
+                <a:solidFill>
+                  <a:schemeClr val="tx1"/>
+                </a:solidFill>
+                <a:latin typeface="+mn-lt"/>
+                <a:ea typeface="+mn-ea"/>
+                <a:cs typeface="+mn-cs"/>
+              </a:defRPr>
+            </a:lvl4pPr>
+            <a:lvl5pPr marL="914400" indent="-228600" algn="l" defTabSz="228600" rtl="0" eaLnBrk="1" latinLnBrk="0" hangingPunct="1">
+              <a:lnSpc>
+                <a:spcPct val="100000"/>
+              </a:lnSpc>
+              <a:spcBef>
+                <a:spcPts val="0"/>
+              </a:spcBef>
+              <a:spcAft>
+                <a:spcPts val="1200"/>
+              </a:spcAft>
+              <a:buFont typeface="System Font"/>
+              <a:buChar char="–"/>
+              <a:defRPr sz="1800" kern="1200">
+                <a:solidFill>
+                  <a:schemeClr val="tx1"/>
+                </a:solidFill>
+                <a:latin typeface="+mn-lt"/>
+                <a:ea typeface="+mn-ea"/>
+                <a:cs typeface="+mn-cs"/>
+              </a:defRPr>
+            </a:lvl5pPr>
+            <a:lvl6pPr marL="11113" indent="0" algn="l" defTabSz="228600" rtl="0" eaLnBrk="1" latinLnBrk="0" hangingPunct="1">
+              <a:lnSpc>
+                <a:spcPct val="90000"/>
+              </a:lnSpc>
+              <a:spcBef>
+                <a:spcPts val="0"/>
+              </a:spcBef>
+              <a:spcAft>
+                <a:spcPts val="1200"/>
+              </a:spcAft>
+              <a:buFont typeface="Graphik" panose="020B0503030202060203" pitchFamily="34" charset="0"/>
+              <a:buNone/>
+              <a:tabLst/>
+              <a:defRPr sz="1600" kern="1200">
+                <a:solidFill>
+                  <a:schemeClr val="tx1"/>
+                </a:solidFill>
+                <a:latin typeface="+mn-lt"/>
+                <a:ea typeface="+mn-ea"/>
+                <a:cs typeface="+mn-cs"/>
+              </a:defRPr>
+            </a:lvl6pPr>
+            <a:lvl7pPr marL="0" indent="0" algn="l" defTabSz="228600" rtl="0" eaLnBrk="1" latinLnBrk="0" hangingPunct="1">
+              <a:lnSpc>
+                <a:spcPct val="90000"/>
+              </a:lnSpc>
+              <a:spcBef>
+                <a:spcPts val="0"/>
+              </a:spcBef>
+              <a:spcAft>
+                <a:spcPts val="1200"/>
+              </a:spcAft>
+              <a:buFont typeface="Arial" panose="020B0604020202020204" pitchFamily="34" charset="0"/>
+              <a:buNone/>
+              <a:defRPr sz="1200" kern="1200">
+                <a:solidFill>
+                  <a:schemeClr val="tx1"/>
+                </a:solidFill>
+                <a:latin typeface="+mn-lt"/>
+                <a:ea typeface="+mn-ea"/>
+                <a:cs typeface="+mn-cs"/>
+              </a:defRPr>
+            </a:lvl7pPr>
+            <a:lvl8pPr marL="0" indent="0" algn="l" defTabSz="228600" rtl="0" eaLnBrk="1" latinLnBrk="0" hangingPunct="1">
+              <a:lnSpc>
+                <a:spcPct val="90000"/>
+              </a:lnSpc>
+              <a:spcBef>
+                <a:spcPts val="0"/>
+              </a:spcBef>
+              <a:spcAft>
+                <a:spcPts val="1200"/>
+              </a:spcAft>
+              <a:buFont typeface="Arial" panose="020B0604020202020204" pitchFamily="34" charset="0"/>
+              <a:buNone/>
+              <a:defRPr sz="1000" b="1" kern="1200">
+                <a:solidFill>
+                  <a:schemeClr val="tx1"/>
+                </a:solidFill>
+                <a:latin typeface="+mn-lt"/>
+                <a:ea typeface="+mn-ea"/>
+                <a:cs typeface="+mn-cs"/>
+              </a:defRPr>
+            </a:lvl8pPr>
+            <a:lvl9pPr marL="0" indent="0" algn="l" defTabSz="228600" rtl="0" eaLnBrk="1" latinLnBrk="0" hangingPunct="1">
+              <a:lnSpc>
+                <a:spcPct val="90000"/>
+              </a:lnSpc>
+              <a:spcBef>
+                <a:spcPts val="0"/>
+              </a:spcBef>
+              <a:spcAft>
+                <a:spcPts val="1200"/>
+              </a:spcAft>
+              <a:buFont typeface="Arial" panose="020B0604020202020204" pitchFamily="34" charset="0"/>
+              <a:buNone/>
+              <a:defRPr sz="800" kern="1200">
+                <a:solidFill>
+                  <a:schemeClr val="tx2"/>
+                </a:solidFill>
+                <a:latin typeface="+mn-lt"/>
+                <a:ea typeface="+mn-ea"/>
+                <a:cs typeface="+mn-cs"/>
+              </a:defRPr>
+            </a:lvl9pPr>
+          </a:lstStyle>
+          <a:p>
+            <a:pPr>
+              <a:defRPr sz="1400"/>
+            </a:pPr>
+            <a:endParaRPr lang="en-GB" sz="1400" dirty="0"/>
+          </a:p>
+        </p:txBody>
+      </p:sp>
+      <p:sp>
+        <p:nvSpPr>
+          <p:cNvPr id="6" name="TextBox 5">
+            <a:extLst>
+              <a:ext uri="{FF2B5EF4-FFF2-40B4-BE49-F238E27FC236}">
+                <a16:creationId xmlns:a16="http://schemas.microsoft.com/office/drawing/2014/main" id="{A86452B4-3B8C-B465-36F4-522F8DE8ED09}"/>
+              </a:ext>
+            </a:extLst>
+          </p:cNvPr>
+          <p:cNvSpPr txBox="1"/>
+          <p:nvPr/>
+        </p:nvSpPr>
+        <p:spPr>
+          <a:xfrm>
+            <a:off x="1081549" y="1423991"/>
+            <a:ext cx="10540179" cy="4324261"/>
+          </a:xfrm>
+          <a:prstGeom prst="rect">
+            <a:avLst/>
+          </a:prstGeom>
+          <a:noFill/>
+        </p:spPr>
+        <p:txBody>
+          <a:bodyPr wrap="square">
+            <a:spAutoFit/>
+          </a:bodyPr>
+          <a:lstStyle/>
+          <a:p>
+            <a:pPr>
+              <a:spcAft>
+                <a:spcPts val="600"/>
+              </a:spcAft>
+              <a:buNone/>
+            </a:pPr>
+            <a:r>
+              <a:rPr lang="en-GB" b="1" dirty="0"/>
+              <a:t>Where to look</a:t>
+            </a:r>
+          </a:p>
+          <a:p>
+            <a:pPr marL="285750" indent="-285750" algn="l">
+              <a:lnSpc>
+                <a:spcPct val="150000"/>
+              </a:lnSpc>
+              <a:buFont typeface="Arial" panose="020B0604020202020204" pitchFamily="34" charset="0"/>
+              <a:buChar char="•"/>
+            </a:pPr>
+            <a:r>
+              <a:rPr lang="en-GB" dirty="0"/>
+              <a:t>File:</a:t>
+            </a:r>
+            <a:r>
+              <a:rPr lang="en-GB" b="0" i="0" dirty="0">
+                <a:solidFill>
+                  <a:srgbClr val="CCCCCC"/>
+                </a:solidFill>
+                <a:effectLst/>
+                <a:latin typeface="Segoe WPC"/>
+              </a:rPr>
+              <a:t> </a:t>
+            </a:r>
+            <a:r>
+              <a:rPr lang="en-GB" b="0" i="0" u="none" strike="noStrike" dirty="0">
+                <a:solidFill>
+                  <a:srgbClr val="CCCCCC"/>
+                </a:solidFill>
+                <a:effectLst/>
+                <a:latin typeface="Segoe WPC"/>
+                <a:hlinkClick r:id="rId3"/>
+              </a:rPr>
+              <a:t>app_simple.py</a:t>
+            </a:r>
+            <a:r>
+              <a:rPr lang="en-GB" b="0" i="0" dirty="0">
+                <a:solidFill>
+                  <a:srgbClr val="CCCCCC"/>
+                </a:solidFill>
+                <a:effectLst/>
+                <a:latin typeface="Segoe WPC"/>
+              </a:rPr>
+              <a:t>  </a:t>
+            </a:r>
+            <a:r>
+              <a:rPr lang="en-GB" dirty="0"/>
+              <a:t>the simple Flask backend</a:t>
+            </a:r>
+          </a:p>
+          <a:p>
+            <a:pPr marL="285750" indent="-285750" algn="l">
+              <a:lnSpc>
+                <a:spcPct val="150000"/>
+              </a:lnSpc>
+              <a:buFont typeface="Arial" panose="020B0604020202020204" pitchFamily="34" charset="0"/>
+              <a:buChar char="•"/>
+            </a:pPr>
+            <a:r>
+              <a:rPr lang="en-GB" dirty="0"/>
+              <a:t>File:</a:t>
+            </a:r>
+            <a:r>
+              <a:rPr lang="en-GB" b="0" i="0" dirty="0">
+                <a:solidFill>
+                  <a:srgbClr val="CCCCCC"/>
+                </a:solidFill>
+                <a:effectLst/>
+                <a:latin typeface="Segoe WPC"/>
+              </a:rPr>
+              <a:t> </a:t>
+            </a:r>
+            <a:r>
+              <a:rPr lang="en-GB" b="0" i="0" u="none" strike="noStrike" dirty="0">
+                <a:solidFill>
+                  <a:srgbClr val="CCCCCC"/>
+                </a:solidFill>
+                <a:effectLst/>
+                <a:latin typeface="Segoe WPC"/>
+                <a:hlinkClick r:id="rId3"/>
+              </a:rPr>
+              <a:t>config.py</a:t>
+            </a:r>
+            <a:r>
+              <a:rPr lang="en-GB" b="0" i="0" dirty="0">
+                <a:solidFill>
+                  <a:srgbClr val="CCCCCC"/>
+                </a:solidFill>
+                <a:effectLst/>
+                <a:latin typeface="Segoe WPC"/>
+              </a:rPr>
+              <a:t>  </a:t>
+            </a:r>
+            <a:r>
+              <a:rPr lang="en-GB" dirty="0"/>
+              <a:t>environment and API key checks</a:t>
+            </a:r>
+          </a:p>
+          <a:p>
+            <a:pPr algn="l">
+              <a:buFont typeface="Arial" panose="020B0604020202020204" pitchFamily="34" charset="0"/>
+              <a:buChar char="•"/>
+            </a:pPr>
+            <a:endParaRPr lang="en-GB" dirty="0">
+              <a:solidFill>
+                <a:srgbClr val="CCCCCC"/>
+              </a:solidFill>
+              <a:latin typeface="Segoe WPC"/>
+            </a:endParaRPr>
+          </a:p>
+          <a:p>
+            <a:pPr>
+              <a:lnSpc>
+                <a:spcPct val="150000"/>
+              </a:lnSpc>
+            </a:pPr>
+            <a:r>
+              <a:rPr lang="en-GB" b="1" dirty="0"/>
+              <a:t>High-level flow</a:t>
+            </a:r>
+          </a:p>
+          <a:p>
+            <a:pPr marL="285750" indent="-285750">
+              <a:lnSpc>
+                <a:spcPct val="150000"/>
+              </a:lnSpc>
+              <a:buFont typeface="Arial" panose="020B0604020202020204" pitchFamily="34" charset="0"/>
+              <a:buChar char="•"/>
+            </a:pPr>
+            <a:r>
+              <a:rPr lang="en-GB" dirty="0"/>
+              <a:t>Load environment variables (API key)</a:t>
+            </a:r>
+          </a:p>
+          <a:p>
+            <a:pPr marL="285750" indent="-285750">
+              <a:lnSpc>
+                <a:spcPct val="150000"/>
+              </a:lnSpc>
+              <a:buFont typeface="Arial" panose="020B0604020202020204" pitchFamily="34" charset="0"/>
+              <a:buChar char="•"/>
+            </a:pPr>
+            <a:r>
+              <a:rPr lang="en-GB" dirty="0"/>
+              <a:t>Configure the Google Generative AI client</a:t>
+            </a:r>
+          </a:p>
+          <a:p>
+            <a:pPr marL="285750" indent="-285750">
+              <a:lnSpc>
+                <a:spcPct val="150000"/>
+              </a:lnSpc>
+              <a:buFont typeface="Arial" panose="020B0604020202020204" pitchFamily="34" charset="0"/>
+              <a:buChar char="•"/>
+            </a:pPr>
+            <a:r>
+              <a:rPr lang="en-GB" dirty="0"/>
+              <a:t>Start a Flask app and enable CORS</a:t>
+            </a:r>
+          </a:p>
+          <a:p>
+            <a:pPr marL="285750" indent="-285750">
+              <a:lnSpc>
+                <a:spcPct val="150000"/>
+              </a:lnSpc>
+              <a:buFont typeface="Arial" panose="020B0604020202020204" pitchFamily="34" charset="0"/>
+              <a:buChar char="•"/>
+            </a:pPr>
+            <a:r>
+              <a:rPr lang="en-GB" dirty="0"/>
+              <a:t>Expose </a:t>
+            </a:r>
+            <a:r>
+              <a:rPr lang="en-GB" dirty="0">
+                <a:hlinkClick r:id="rId3"/>
+              </a:rPr>
+              <a:t>/generate-prompt</a:t>
+            </a:r>
+            <a:r>
+              <a:rPr lang="en-GB" dirty="0"/>
+              <a:t> (POST): read JSON → build prompt → call model → return JSON</a:t>
+            </a:r>
+          </a:p>
+          <a:p>
+            <a:pPr marL="285750" indent="-285750">
+              <a:lnSpc>
+                <a:spcPct val="150000"/>
+              </a:lnSpc>
+              <a:buFont typeface="Arial" panose="020B0604020202020204" pitchFamily="34" charset="0"/>
+              <a:buChar char="•"/>
+            </a:pPr>
+            <a:r>
+              <a:rPr lang="en-GB" dirty="0"/>
+              <a:t>Expose </a:t>
+            </a:r>
+            <a:r>
+              <a:rPr lang="en-GB" dirty="0">
+                <a:hlinkClick r:id="rId3"/>
+              </a:rPr>
+              <a:t>/health</a:t>
+            </a:r>
+            <a:r>
+              <a:rPr lang="en-GB" dirty="0"/>
+              <a:t> (GET) for a simple status check</a:t>
+            </a:r>
+          </a:p>
+          <a:p>
+            <a:pPr algn="l">
+              <a:buFont typeface="Arial" panose="020B0604020202020204" pitchFamily="34" charset="0"/>
+              <a:buChar char="•"/>
+            </a:pPr>
+            <a:endParaRPr lang="en-GB" b="0" i="0" dirty="0">
+              <a:solidFill>
+                <a:srgbClr val="CCCCCC"/>
+              </a:solidFill>
+              <a:effectLst/>
+              <a:latin typeface="Segoe WPC"/>
+            </a:endParaRPr>
+          </a:p>
+        </p:txBody>
+      </p:sp>
+    </p:spTree>
+    <p:extLst>
+      <p:ext uri="{BB962C8B-B14F-4D97-AF65-F5344CB8AC3E}">
+        <p14:creationId xmlns:p14="http://schemas.microsoft.com/office/powerpoint/2010/main" val="1834763470"/>
+      </p:ext>
+    </p:extLst>
+  </p:cSld>
+  <p:clrMapOvr>
+    <a:masterClrMapping/>
+  </p:clrMapOvr>
+  <mc:AlternateContent xmlns:mc="http://schemas.openxmlformats.org/markup-compatibility/2006" xmlns:p14="http://schemas.microsoft.com/office/powerpoint/2010/main">
+    <mc:Choice Requires="p14">
+      <p:transition spd="med" p14:dur="700">
+        <p:fade/>
+      </p:transition>
+    </mc:Choice>
+    <mc:Fallback xmlns="">
+      <p:transition spd="med">
+        <p:fade/>
+      </p:transition>
+    </mc:Fallback>
+  </mc:AlternateContent>
+</p:sld>
+</file>
+
+<file path=ppt/slides/slide41.xml><?xml version="1.0" encoding="utf-8"?>
+<p:sld xmlns:a="http://schemas.openxmlformats.org/drawingml/2006/main" xmlns:r="http://schemas.openxmlformats.org/officeDocument/2006/relationships" xmlns:p="http://schemas.openxmlformats.org/presentationml/2006/main">
+  <p:cSld>
+    <p:spTree>
+      <p:nvGrpSpPr>
+        <p:cNvPr id="1" name="">
+          <a:extLst>
+            <a:ext uri="{FF2B5EF4-FFF2-40B4-BE49-F238E27FC236}">
+              <a16:creationId xmlns:a16="http://schemas.microsoft.com/office/drawing/2014/main" id="{F2E3A24C-BF5C-F81C-0DF6-082CF6F31799}"/>
+            </a:ext>
+          </a:extLst>
+        </p:cNvPr>
+        <p:cNvGrpSpPr/>
+        <p:nvPr/>
+      </p:nvGrpSpPr>
+      <p:grpSpPr>
+        <a:xfrm>
+          <a:off x="0" y="0"/>
+          <a:ext cx="0" cy="0"/>
+          <a:chOff x="0" y="0"/>
+          <a:chExt cx="0" cy="0"/>
+        </a:xfrm>
+      </p:grpSpPr>
+      <p:sp>
+        <p:nvSpPr>
+          <p:cNvPr id="2" name="Title 1">
+            <a:extLst>
+              <a:ext uri="{FF2B5EF4-FFF2-40B4-BE49-F238E27FC236}">
+                <a16:creationId xmlns:a16="http://schemas.microsoft.com/office/drawing/2014/main" id="{0B3547FE-06E6-85F9-CE61-8561104F2AD2}"/>
+              </a:ext>
+            </a:extLst>
+          </p:cNvPr>
+          <p:cNvSpPr>
+            <a:spLocks noGrp="1"/>
+          </p:cNvSpPr>
+          <p:nvPr>
+            <p:ph type="title"/>
+          </p:nvPr>
+        </p:nvSpPr>
+        <p:spPr/>
+        <p:txBody>
+          <a:bodyPr/>
+          <a:lstStyle/>
+          <a:p>
+            <a:r>
+              <a:rPr lang="en-GB" sz="3200" dirty="0">
+                <a:solidFill>
+                  <a:schemeClr val="accent2"/>
+                </a:solidFill>
+              </a:rPr>
+              <a:t>Python </a:t>
+            </a:r>
+            <a:r>
+              <a:rPr lang="en-GB" sz="3200" dirty="0"/>
+              <a:t>– </a:t>
+            </a:r>
+            <a:r>
+              <a:rPr lang="en-GB" dirty="0"/>
+              <a:t> Code Walkthrough:</a:t>
+            </a:r>
+            <a:br>
+              <a:rPr lang="en-GB" dirty="0"/>
+            </a:br>
+            <a:r>
+              <a:rPr lang="en-GB" sz="3200" dirty="0"/>
+              <a:t>Read the Files  Quick Guide 📄</a:t>
+            </a:r>
+          </a:p>
+        </p:txBody>
+      </p:sp>
+      <p:sp>
+        <p:nvSpPr>
+          <p:cNvPr id="3" name="Content Placeholder 2">
+            <a:extLst>
+              <a:ext uri="{FF2B5EF4-FFF2-40B4-BE49-F238E27FC236}">
+                <a16:creationId xmlns:a16="http://schemas.microsoft.com/office/drawing/2014/main" id="{322A34E4-AC54-9BA3-EBBB-49537842A74E}"/>
+              </a:ext>
+            </a:extLst>
+          </p:cNvPr>
+          <p:cNvSpPr>
+            <a:spLocks noGrp="1"/>
+          </p:cNvSpPr>
+          <p:nvPr>
+            <p:ph sz="quarter" idx="10"/>
+          </p:nvPr>
+        </p:nvSpPr>
+        <p:spPr>
+          <a:xfrm>
+            <a:off x="381001" y="1243584"/>
+            <a:ext cx="11430000" cy="5068317"/>
+          </a:xfrm>
+        </p:spPr>
+        <p:txBody>
+          <a:bodyPr vert="horz" lIns="0" tIns="0" rIns="0" bIns="0" rtlCol="0" anchor="t">
+            <a:noAutofit/>
+          </a:bodyPr>
+          <a:lstStyle/>
+          <a:p>
+            <a:pPr>
+              <a:defRPr sz="1400"/>
+            </a:pPr>
+            <a:br>
+              <a:rPr lang="en-GB" dirty="0"/>
+            </a:br>
+            <a:endParaRPr lang="en-GB" dirty="0"/>
+          </a:p>
+        </p:txBody>
+      </p:sp>
+      <p:sp>
+        <p:nvSpPr>
+          <p:cNvPr id="4" name="Content Placeholder 2">
+            <a:extLst>
+              <a:ext uri="{FF2B5EF4-FFF2-40B4-BE49-F238E27FC236}">
+                <a16:creationId xmlns:a16="http://schemas.microsoft.com/office/drawing/2014/main" id="{C250463B-EFFA-65A8-AE8C-DA73DF9BCBFC}"/>
+              </a:ext>
+            </a:extLst>
+          </p:cNvPr>
+          <p:cNvSpPr txBox="1">
+            <a:spLocks/>
+          </p:cNvSpPr>
+          <p:nvPr/>
+        </p:nvSpPr>
+        <p:spPr>
+          <a:xfrm>
+            <a:off x="380999" y="1339342"/>
+            <a:ext cx="10977716" cy="4876800"/>
+          </a:xfrm>
+          <a:prstGeom prst="rect">
+            <a:avLst/>
+          </a:prstGeom>
+        </p:spPr>
+        <p:txBody>
+          <a:bodyPr/>
+          <a:lstStyle>
+            <a:lvl1pPr marL="0" indent="0" algn="l" defTabSz="228600" rtl="0" eaLnBrk="1" latinLnBrk="0" hangingPunct="1">
+              <a:lnSpc>
+                <a:spcPct val="100000"/>
+              </a:lnSpc>
+              <a:spcBef>
+                <a:spcPts val="0"/>
+              </a:spcBef>
+              <a:spcAft>
+                <a:spcPts val="1200"/>
+              </a:spcAft>
+              <a:buFont typeface="Arial" panose="020B0604020202020204" pitchFamily="34" charset="0"/>
+              <a:buNone/>
+              <a:defRPr sz="2000" b="0" kern="1200">
+                <a:solidFill>
+                  <a:schemeClr val="tx1"/>
+                </a:solidFill>
+                <a:latin typeface="+mn-lt"/>
+                <a:ea typeface="+mn-ea"/>
+                <a:cs typeface="+mn-cs"/>
+              </a:defRPr>
+            </a:lvl1pPr>
+            <a:lvl2pPr marL="228600" indent="-228600" algn="l" defTabSz="228600" rtl="0" eaLnBrk="1" latinLnBrk="0" hangingPunct="1">
+              <a:lnSpc>
+                <a:spcPct val="100000"/>
+              </a:lnSpc>
+              <a:spcBef>
+                <a:spcPts val="0"/>
+              </a:spcBef>
+              <a:spcAft>
+                <a:spcPts val="1200"/>
+              </a:spcAft>
+              <a:buClrTx/>
+              <a:buFont typeface="Arial" panose="020B0604020202020204" pitchFamily="34" charset="0"/>
+              <a:buChar char="•"/>
+              <a:defRPr sz="2000" kern="1200">
+                <a:solidFill>
+                  <a:schemeClr val="tx1"/>
+                </a:solidFill>
+                <a:latin typeface="+mn-lt"/>
+                <a:ea typeface="+mn-ea"/>
+                <a:cs typeface="+mn-cs"/>
+              </a:defRPr>
+            </a:lvl2pPr>
+            <a:lvl3pPr marL="457200" indent="-228600" algn="l" defTabSz="228600" rtl="0" eaLnBrk="1" latinLnBrk="0" hangingPunct="1">
+              <a:lnSpc>
+                <a:spcPct val="100000"/>
+              </a:lnSpc>
+              <a:spcBef>
+                <a:spcPts val="0"/>
+              </a:spcBef>
+              <a:spcAft>
+                <a:spcPts val="1200"/>
+              </a:spcAft>
+              <a:buFont typeface="System Font"/>
+              <a:buChar char="–"/>
+              <a:defRPr sz="2000" kern="1200">
+                <a:solidFill>
+                  <a:schemeClr val="tx1"/>
+                </a:solidFill>
+                <a:latin typeface="+mn-lt"/>
+                <a:ea typeface="+mn-ea"/>
+                <a:cs typeface="+mn-cs"/>
+              </a:defRPr>
+            </a:lvl3pPr>
+            <a:lvl4pPr marL="685800" indent="-228600" algn="l" defTabSz="228600" rtl="0" eaLnBrk="1" latinLnBrk="0" hangingPunct="1">
+              <a:lnSpc>
+                <a:spcPct val="100000"/>
+              </a:lnSpc>
+              <a:spcBef>
+                <a:spcPts val="0"/>
+              </a:spcBef>
+              <a:spcAft>
+                <a:spcPts val="1200"/>
+              </a:spcAft>
+              <a:buFont typeface="Arial" panose="020B0604020202020204" pitchFamily="34" charset="0"/>
+              <a:buChar char="•"/>
+              <a:defRPr sz="1800" kern="1200">
+                <a:solidFill>
+                  <a:schemeClr val="tx1"/>
+                </a:solidFill>
+                <a:latin typeface="+mn-lt"/>
+                <a:ea typeface="+mn-ea"/>
+                <a:cs typeface="+mn-cs"/>
+              </a:defRPr>
+            </a:lvl4pPr>
+            <a:lvl5pPr marL="914400" indent="-228600" algn="l" defTabSz="228600" rtl="0" eaLnBrk="1" latinLnBrk="0" hangingPunct="1">
+              <a:lnSpc>
+                <a:spcPct val="100000"/>
+              </a:lnSpc>
+              <a:spcBef>
+                <a:spcPts val="0"/>
+              </a:spcBef>
+              <a:spcAft>
+                <a:spcPts val="1200"/>
+              </a:spcAft>
+              <a:buFont typeface="System Font"/>
+              <a:buChar char="–"/>
+              <a:defRPr sz="1800" kern="1200">
+                <a:solidFill>
+                  <a:schemeClr val="tx1"/>
+                </a:solidFill>
+                <a:latin typeface="+mn-lt"/>
+                <a:ea typeface="+mn-ea"/>
+                <a:cs typeface="+mn-cs"/>
+              </a:defRPr>
+            </a:lvl5pPr>
+            <a:lvl6pPr marL="11113" indent="0" algn="l" defTabSz="228600" rtl="0" eaLnBrk="1" latinLnBrk="0" hangingPunct="1">
+              <a:lnSpc>
+                <a:spcPct val="90000"/>
+              </a:lnSpc>
+              <a:spcBef>
+                <a:spcPts val="0"/>
+              </a:spcBef>
+              <a:spcAft>
+                <a:spcPts val="1200"/>
+              </a:spcAft>
+              <a:buFont typeface="Graphik" panose="020B0503030202060203" pitchFamily="34" charset="0"/>
+              <a:buNone/>
+              <a:tabLst/>
+              <a:defRPr sz="1600" kern="1200">
+                <a:solidFill>
+                  <a:schemeClr val="tx1"/>
+                </a:solidFill>
+                <a:latin typeface="+mn-lt"/>
+                <a:ea typeface="+mn-ea"/>
+                <a:cs typeface="+mn-cs"/>
+              </a:defRPr>
+            </a:lvl6pPr>
+            <a:lvl7pPr marL="0" indent="0" algn="l" defTabSz="228600" rtl="0" eaLnBrk="1" latinLnBrk="0" hangingPunct="1">
+              <a:lnSpc>
+                <a:spcPct val="90000"/>
+              </a:lnSpc>
+              <a:spcBef>
+                <a:spcPts val="0"/>
+              </a:spcBef>
+              <a:spcAft>
+                <a:spcPts val="1200"/>
+              </a:spcAft>
+              <a:buFont typeface="Arial" panose="020B0604020202020204" pitchFamily="34" charset="0"/>
+              <a:buNone/>
+              <a:defRPr sz="1200" kern="1200">
+                <a:solidFill>
+                  <a:schemeClr val="tx1"/>
+                </a:solidFill>
+                <a:latin typeface="+mn-lt"/>
+                <a:ea typeface="+mn-ea"/>
+                <a:cs typeface="+mn-cs"/>
+              </a:defRPr>
+            </a:lvl7pPr>
+            <a:lvl8pPr marL="0" indent="0" algn="l" defTabSz="228600" rtl="0" eaLnBrk="1" latinLnBrk="0" hangingPunct="1">
+              <a:lnSpc>
+                <a:spcPct val="90000"/>
+              </a:lnSpc>
+              <a:spcBef>
+                <a:spcPts val="0"/>
+              </a:spcBef>
+              <a:spcAft>
+                <a:spcPts val="1200"/>
+              </a:spcAft>
+              <a:buFont typeface="Arial" panose="020B0604020202020204" pitchFamily="34" charset="0"/>
+              <a:buNone/>
+              <a:defRPr sz="1000" b="1" kern="1200">
+                <a:solidFill>
+                  <a:schemeClr val="tx1"/>
+                </a:solidFill>
+                <a:latin typeface="+mn-lt"/>
+                <a:ea typeface="+mn-ea"/>
+                <a:cs typeface="+mn-cs"/>
+              </a:defRPr>
+            </a:lvl8pPr>
+            <a:lvl9pPr marL="0" indent="0" algn="l" defTabSz="228600" rtl="0" eaLnBrk="1" latinLnBrk="0" hangingPunct="1">
+              <a:lnSpc>
+                <a:spcPct val="90000"/>
+              </a:lnSpc>
+              <a:spcBef>
+                <a:spcPts val="0"/>
+              </a:spcBef>
+              <a:spcAft>
+                <a:spcPts val="1200"/>
+              </a:spcAft>
+              <a:buFont typeface="Arial" panose="020B0604020202020204" pitchFamily="34" charset="0"/>
+              <a:buNone/>
+              <a:defRPr sz="800" kern="1200">
+                <a:solidFill>
+                  <a:schemeClr val="tx2"/>
+                </a:solidFill>
+                <a:latin typeface="+mn-lt"/>
+                <a:ea typeface="+mn-ea"/>
+                <a:cs typeface="+mn-cs"/>
+              </a:defRPr>
+            </a:lvl9pPr>
+          </a:lstStyle>
+          <a:p>
+            <a:pPr>
+              <a:defRPr sz="1400"/>
+            </a:pPr>
+            <a:endParaRPr lang="en-GB" sz="1400" dirty="0"/>
+          </a:p>
+        </p:txBody>
+      </p:sp>
+      <p:sp>
+        <p:nvSpPr>
+          <p:cNvPr id="6" name="TextBox 5">
+            <a:extLst>
+              <a:ext uri="{FF2B5EF4-FFF2-40B4-BE49-F238E27FC236}">
+                <a16:creationId xmlns:a16="http://schemas.microsoft.com/office/drawing/2014/main" id="{9DCE1B17-A509-AE16-ACCA-677178929523}"/>
+              </a:ext>
+            </a:extLst>
+          </p:cNvPr>
+          <p:cNvSpPr txBox="1"/>
+          <p:nvPr/>
+        </p:nvSpPr>
+        <p:spPr>
+          <a:xfrm>
+            <a:off x="380998" y="1243584"/>
+            <a:ext cx="11063747" cy="5355312"/>
+          </a:xfrm>
+          <a:prstGeom prst="rect">
+            <a:avLst/>
+          </a:prstGeom>
+          <a:noFill/>
+        </p:spPr>
+        <p:txBody>
+          <a:bodyPr wrap="square">
+            <a:spAutoFit/>
+          </a:bodyPr>
+          <a:lstStyle/>
+          <a:p>
+            <a:pPr>
+              <a:lnSpc>
+                <a:spcPct val="150000"/>
+              </a:lnSpc>
+            </a:pPr>
+            <a:r>
+              <a:rPr lang="en-GB" b="1" dirty="0"/>
+              <a:t>Key constructs and examples (map to lines in </a:t>
+            </a:r>
+            <a:r>
+              <a:rPr lang="en-GB" dirty="0">
+                <a:hlinkClick r:id="rId3"/>
+              </a:rPr>
+              <a:t>app_simple.py</a:t>
+            </a:r>
+            <a:r>
+              <a:rPr lang="en-GB" b="1" dirty="0"/>
+              <a:t>)</a:t>
+            </a:r>
+          </a:p>
+          <a:p>
+            <a:pPr>
+              <a:lnSpc>
+                <a:spcPct val="150000"/>
+              </a:lnSpc>
+            </a:pPr>
+            <a:r>
+              <a:rPr lang="en-GB" b="1" dirty="0"/>
+              <a:t>Imports: </a:t>
+            </a:r>
+            <a:r>
+              <a:rPr lang="en-GB" dirty="0"/>
+              <a:t> bring packages into the file: </a:t>
+            </a:r>
+            <a:r>
+              <a:rPr lang="en-GB" dirty="0">
+                <a:hlinkClick r:id="rId3"/>
+              </a:rPr>
+              <a:t>import </a:t>
+            </a:r>
+            <a:r>
+              <a:rPr lang="en-GB" dirty="0" err="1">
+                <a:hlinkClick r:id="rId3"/>
+              </a:rPr>
+              <a:t>os</a:t>
+            </a:r>
+            <a:r>
+              <a:rPr lang="en-GB" dirty="0"/>
+              <a:t>, </a:t>
+            </a:r>
+            <a:r>
+              <a:rPr lang="en-GB" dirty="0">
+                <a:hlinkClick r:id="rId3"/>
+              </a:rPr>
+              <a:t>from flask import Flask, request, </a:t>
+            </a:r>
+            <a:r>
+              <a:rPr lang="en-GB" dirty="0" err="1">
+                <a:hlinkClick r:id="rId3"/>
+              </a:rPr>
+              <a:t>jsonify</a:t>
+            </a:r>
+            <a:endParaRPr lang="en-GB" dirty="0"/>
+          </a:p>
+          <a:p>
+            <a:pPr>
+              <a:lnSpc>
+                <a:spcPct val="150000"/>
+              </a:lnSpc>
+            </a:pPr>
+            <a:r>
+              <a:rPr lang="en-GB" b="1" dirty="0"/>
+              <a:t>Load env:</a:t>
+            </a:r>
+            <a:r>
+              <a:rPr lang="en-GB" dirty="0"/>
+              <a:t> </a:t>
+            </a:r>
+            <a:r>
+              <a:rPr lang="en-GB" dirty="0" err="1">
+                <a:hlinkClick r:id="rId3"/>
+              </a:rPr>
+              <a:t>load_dotenv</a:t>
+            </a:r>
+            <a:r>
+              <a:rPr lang="en-GB" dirty="0">
+                <a:hlinkClick r:id="rId3"/>
+              </a:rPr>
+              <a:t>()</a:t>
+            </a:r>
+            <a:r>
+              <a:rPr lang="en-GB" dirty="0"/>
+              <a:t> and </a:t>
+            </a:r>
+            <a:r>
+              <a:rPr lang="en-GB" dirty="0">
+                <a:hlinkClick r:id="rId3"/>
+              </a:rPr>
+              <a:t>API_KEY = </a:t>
+            </a:r>
+            <a:r>
+              <a:rPr lang="en-GB" dirty="0" err="1">
+                <a:hlinkClick r:id="rId3"/>
+              </a:rPr>
+              <a:t>os.getenv</a:t>
+            </a:r>
+            <a:r>
+              <a:rPr lang="en-GB" dirty="0">
+                <a:hlinkClick r:id="rId3"/>
+              </a:rPr>
+              <a:t>('GOOGLE_API_KEY')</a:t>
+            </a:r>
+            <a:r>
+              <a:rPr lang="en-GB" dirty="0"/>
+              <a:t> (safe secret handling)</a:t>
+            </a:r>
+          </a:p>
+          <a:p>
+            <a:pPr>
+              <a:lnSpc>
+                <a:spcPct val="150000"/>
+              </a:lnSpc>
+            </a:pPr>
+            <a:r>
+              <a:rPr lang="en-GB" b="1" dirty="0"/>
+              <a:t>Condition / Guard:</a:t>
+            </a:r>
+            <a:r>
+              <a:rPr lang="en-GB" dirty="0"/>
+              <a:t> </a:t>
+            </a:r>
+            <a:r>
+              <a:rPr lang="en-GB" dirty="0">
+                <a:hlinkClick r:id="rId3"/>
+              </a:rPr>
+              <a:t>if not API_KEY: raise </a:t>
+            </a:r>
+            <a:r>
+              <a:rPr lang="en-GB" dirty="0" err="1">
+                <a:hlinkClick r:id="rId3"/>
+              </a:rPr>
+              <a:t>RuntimeError</a:t>
+            </a:r>
+            <a:r>
+              <a:rPr lang="en-GB" dirty="0">
+                <a:hlinkClick r:id="rId3"/>
+              </a:rPr>
+              <a:t>(...)</a:t>
+            </a:r>
+            <a:r>
+              <a:rPr lang="en-GB" dirty="0"/>
+              <a:t> (fail fast with clear message)</a:t>
+            </a:r>
+          </a:p>
+          <a:p>
+            <a:pPr>
+              <a:lnSpc>
+                <a:spcPct val="150000"/>
+              </a:lnSpc>
+            </a:pPr>
+            <a:r>
+              <a:rPr lang="en-GB" b="1" dirty="0"/>
+              <a:t>Flask app &amp; decorator:</a:t>
+            </a:r>
+            <a:r>
+              <a:rPr lang="en-GB" dirty="0"/>
+              <a:t> </a:t>
+            </a:r>
+            <a:r>
+              <a:rPr lang="en-GB" dirty="0">
+                <a:hlinkClick r:id="rId3"/>
+              </a:rPr>
+              <a:t>@app.route('/generate-prompt', methods=['POST'])</a:t>
+            </a:r>
+            <a:r>
+              <a:rPr lang="en-GB" dirty="0"/>
+              <a:t> defines a request handler function</a:t>
+            </a:r>
+          </a:p>
+          <a:p>
+            <a:pPr>
+              <a:lnSpc>
+                <a:spcPct val="150000"/>
+              </a:lnSpc>
+            </a:pPr>
+            <a:r>
+              <a:rPr lang="en-GB" b="1" dirty="0"/>
+              <a:t>Reading JSON:</a:t>
+            </a:r>
+            <a:r>
+              <a:rPr lang="en-GB" dirty="0"/>
+              <a:t> </a:t>
+            </a:r>
+            <a:r>
+              <a:rPr lang="en-GB" dirty="0">
+                <a:hlinkClick r:id="rId3"/>
+              </a:rPr>
+              <a:t>data = </a:t>
+            </a:r>
+            <a:r>
+              <a:rPr lang="en-GB" dirty="0" err="1">
+                <a:hlinkClick r:id="rId3"/>
+              </a:rPr>
+              <a:t>request.get_json</a:t>
+            </a:r>
+            <a:r>
+              <a:rPr lang="en-GB" dirty="0">
+                <a:hlinkClick r:id="rId3"/>
+              </a:rPr>
+              <a:t>() or {}</a:t>
+            </a:r>
+            <a:r>
+              <a:rPr lang="en-GB" dirty="0"/>
+              <a:t> (safe extraction with defaults)</a:t>
+            </a:r>
+          </a:p>
+          <a:p>
+            <a:pPr>
+              <a:lnSpc>
+                <a:spcPct val="150000"/>
+              </a:lnSpc>
+            </a:pPr>
+            <a:r>
+              <a:rPr lang="en-GB" b="1" dirty="0"/>
+              <a:t>String &amp; list handling:</a:t>
+            </a:r>
+            <a:r>
+              <a:rPr lang="en-GB" dirty="0"/>
+              <a:t> </a:t>
+            </a:r>
+            <a:r>
+              <a:rPr lang="en-GB" dirty="0" err="1">
+                <a:hlinkClick r:id="rId3"/>
+              </a:rPr>
+              <a:t>studies_text</a:t>
+            </a:r>
+            <a:r>
+              <a:rPr lang="en-GB" dirty="0">
+                <a:hlinkClick r:id="rId3"/>
+              </a:rPr>
+              <a:t> = ', '.join(studies)</a:t>
+            </a:r>
+            <a:r>
+              <a:rPr lang="en-GB" dirty="0"/>
+              <a:t> (list → readable string)</a:t>
+            </a:r>
+          </a:p>
+          <a:p>
+            <a:pPr>
+              <a:lnSpc>
+                <a:spcPct val="150000"/>
+              </a:lnSpc>
+            </a:pPr>
+            <a:r>
+              <a:rPr lang="en-GB" b="1" dirty="0"/>
+              <a:t>Calling external APIs:</a:t>
+            </a:r>
+            <a:r>
+              <a:rPr lang="en-GB" dirty="0"/>
+              <a:t> </a:t>
+            </a:r>
+            <a:r>
+              <a:rPr lang="en-GB" dirty="0" err="1">
+                <a:hlinkClick r:id="rId3"/>
+              </a:rPr>
+              <a:t>model.generate_content</a:t>
+            </a:r>
+            <a:r>
+              <a:rPr lang="en-GB" dirty="0">
+                <a:hlinkClick r:id="rId3"/>
+              </a:rPr>
+              <a:t>(prompt)</a:t>
+            </a:r>
+            <a:r>
+              <a:rPr lang="en-GB" dirty="0"/>
+              <a:t> (use the client library to call an LLM)</a:t>
+            </a:r>
+          </a:p>
+          <a:p>
+            <a:pPr>
+              <a:lnSpc>
+                <a:spcPct val="150000"/>
+              </a:lnSpc>
+            </a:pPr>
+            <a:r>
+              <a:rPr lang="en-GB" b="1" dirty="0"/>
+              <a:t>Safe attribute access:</a:t>
+            </a:r>
+            <a:r>
+              <a:rPr lang="en-GB" dirty="0"/>
+              <a:t> </a:t>
+            </a:r>
+            <a:r>
+              <a:rPr lang="en-GB" dirty="0" err="1">
+                <a:hlinkClick r:id="rId3"/>
+              </a:rPr>
+              <a:t>getattr</a:t>
+            </a:r>
+            <a:r>
+              <a:rPr lang="en-GB" dirty="0">
+                <a:hlinkClick r:id="rId3"/>
+              </a:rPr>
+              <a:t>(response, 'text', str(response))</a:t>
+            </a:r>
+            <a:r>
+              <a:rPr lang="en-GB" dirty="0"/>
+              <a:t> (avoid attribute errors)</a:t>
+            </a:r>
+          </a:p>
+          <a:p>
+            <a:pPr>
+              <a:lnSpc>
+                <a:spcPct val="150000"/>
+              </a:lnSpc>
+            </a:pPr>
+            <a:r>
+              <a:rPr lang="en-GB" b="1" dirty="0"/>
+              <a:t>Return JSON response:</a:t>
+            </a:r>
+            <a:r>
+              <a:rPr lang="en-GB" dirty="0"/>
+              <a:t> return </a:t>
+            </a:r>
+            <a:r>
+              <a:rPr lang="en-GB" dirty="0" err="1"/>
+              <a:t>jsonify</a:t>
+            </a:r>
+            <a:r>
+              <a:rPr lang="en-GB" dirty="0"/>
+              <a:t>({'success': True, 'response': </a:t>
+            </a:r>
+            <a:r>
+              <a:rPr lang="en-GB" dirty="0" err="1"/>
+              <a:t>ai_text</a:t>
+            </a:r>
+            <a:r>
+              <a:rPr lang="en-GB" dirty="0"/>
+              <a:t>}), 200</a:t>
+            </a:r>
+          </a:p>
+          <a:p>
+            <a:pPr>
+              <a:lnSpc>
+                <a:spcPct val="150000"/>
+              </a:lnSpc>
+            </a:pPr>
+            <a:r>
+              <a:rPr lang="en-GB" b="1" dirty="0"/>
+              <a:t>Main guard: </a:t>
+            </a:r>
+            <a:r>
+              <a:rPr lang="en-GB" dirty="0">
+                <a:hlinkClick r:id="rId3"/>
+              </a:rPr>
+              <a:t>if __name__ == '__main__': </a:t>
+            </a:r>
+            <a:r>
+              <a:rPr lang="en-GB" dirty="0" err="1">
+                <a:hlinkClick r:id="rId3"/>
+              </a:rPr>
+              <a:t>app.run</a:t>
+            </a:r>
+            <a:r>
+              <a:rPr lang="en-GB" dirty="0">
+                <a:hlinkClick r:id="rId3"/>
+              </a:rPr>
+              <a:t>(...)</a:t>
+            </a:r>
+            <a:r>
+              <a:rPr lang="en-GB" dirty="0"/>
+              <a:t> (run app only when executed directly)</a:t>
+            </a:r>
+          </a:p>
+          <a:p>
+            <a:pPr algn="l">
+              <a:buFont typeface="Arial" panose="020B0604020202020204" pitchFamily="34" charset="0"/>
+              <a:buChar char="•"/>
+            </a:pPr>
+            <a:endParaRPr lang="en-GB" b="0" i="0" dirty="0">
+              <a:solidFill>
+                <a:srgbClr val="CCCCCC"/>
+              </a:solidFill>
+              <a:effectLst/>
+              <a:latin typeface="Segoe WPC"/>
+            </a:endParaRPr>
+          </a:p>
+        </p:txBody>
+      </p:sp>
+    </p:spTree>
+    <p:extLst>
+      <p:ext uri="{BB962C8B-B14F-4D97-AF65-F5344CB8AC3E}">
+        <p14:creationId xmlns:p14="http://schemas.microsoft.com/office/powerpoint/2010/main" val="2405996796"/>
+      </p:ext>
+    </p:extLst>
+  </p:cSld>
+  <p:clrMapOvr>
+    <a:masterClrMapping/>
+  </p:clrMapOvr>
+  <mc:AlternateContent xmlns:mc="http://schemas.openxmlformats.org/markup-compatibility/2006">
+    <mc:Choice xmlns:p14="http://schemas.microsoft.com/office/powerpoint/2010/main" Requires="p14">
+      <p:transition spd="med" p14:dur="700">
+        <p:fade/>
+      </p:transition>
+    </mc:Choice>
+    <mc:Fallback>
+      <p:transition spd="med">
+        <p:fade/>
+      </p:transition>
+    </mc:Fallback>
+  </mc:AlternateContent>
+</p:sld>
+</file>
+
+<file path=ppt/slides/slide42.xml><?xml version="1.0" encoding="utf-8"?>
+<p:sld xmlns:a="http://schemas.openxmlformats.org/drawingml/2006/main" xmlns:r="http://schemas.openxmlformats.org/officeDocument/2006/relationships" xmlns:p="http://schemas.openxmlformats.org/presentationml/2006/main">
+  <p:cSld>
+    <p:spTree>
+      <p:nvGrpSpPr>
+        <p:cNvPr id="1" name="">
+          <a:extLst>
+            <a:ext uri="{FF2B5EF4-FFF2-40B4-BE49-F238E27FC236}">
+              <a16:creationId xmlns:a16="http://schemas.microsoft.com/office/drawing/2014/main" id="{B9446664-35C4-5879-A5D2-7F49101DD9A9}"/>
+            </a:ext>
+          </a:extLst>
+        </p:cNvPr>
+        <p:cNvGrpSpPr/>
+        <p:nvPr/>
+      </p:nvGrpSpPr>
+      <p:grpSpPr>
+        <a:xfrm>
+          <a:off x="0" y="0"/>
+          <a:ext cx="0" cy="0"/>
+          <a:chOff x="0" y="0"/>
+          <a:chExt cx="0" cy="0"/>
+        </a:xfrm>
+      </p:grpSpPr>
+      <p:sp>
+        <p:nvSpPr>
+          <p:cNvPr id="2" name="Title 1">
+            <a:extLst>
+              <a:ext uri="{FF2B5EF4-FFF2-40B4-BE49-F238E27FC236}">
+                <a16:creationId xmlns:a16="http://schemas.microsoft.com/office/drawing/2014/main" id="{AAE0A2F1-55E9-02B3-317B-39F3EB571CE7}"/>
+              </a:ext>
+            </a:extLst>
+          </p:cNvPr>
+          <p:cNvSpPr>
+            <a:spLocks noGrp="1"/>
+          </p:cNvSpPr>
+          <p:nvPr>
+            <p:ph type="title"/>
+          </p:nvPr>
+        </p:nvSpPr>
+        <p:spPr/>
+        <p:txBody>
+          <a:bodyPr/>
+          <a:lstStyle/>
+          <a:p>
+            <a:r>
+              <a:rPr lang="en-GB" sz="3200" dirty="0">
+                <a:solidFill>
+                  <a:schemeClr val="accent2"/>
+                </a:solidFill>
+              </a:rPr>
+              <a:t>Python </a:t>
+            </a:r>
+            <a:r>
+              <a:rPr lang="en-GB" sz="3200" dirty="0"/>
+              <a:t>– </a:t>
+            </a:r>
+            <a:r>
+              <a:rPr lang="en-GB" dirty="0"/>
+              <a:t> Code Walkthrough:</a:t>
+            </a:r>
+            <a:br>
+              <a:rPr lang="en-GB" dirty="0"/>
+            </a:br>
+            <a:r>
+              <a:rPr lang="en-GB" sz="3200" dirty="0"/>
+              <a:t>Read the Files  Quick Guide 📄</a:t>
+            </a:r>
+          </a:p>
+        </p:txBody>
+      </p:sp>
+      <p:sp>
+        <p:nvSpPr>
+          <p:cNvPr id="3" name="Content Placeholder 2">
+            <a:extLst>
+              <a:ext uri="{FF2B5EF4-FFF2-40B4-BE49-F238E27FC236}">
+                <a16:creationId xmlns:a16="http://schemas.microsoft.com/office/drawing/2014/main" id="{F3127771-C995-4687-FBE7-861D465CC13D}"/>
+              </a:ext>
+            </a:extLst>
+          </p:cNvPr>
+          <p:cNvSpPr>
+            <a:spLocks noGrp="1"/>
+          </p:cNvSpPr>
+          <p:nvPr>
+            <p:ph sz="quarter" idx="10"/>
+          </p:nvPr>
+        </p:nvSpPr>
+        <p:spPr>
+          <a:xfrm>
+            <a:off x="381001" y="1243584"/>
+            <a:ext cx="11430000" cy="5068317"/>
+          </a:xfrm>
+        </p:spPr>
+        <p:txBody>
+          <a:bodyPr vert="horz" lIns="0" tIns="0" rIns="0" bIns="0" rtlCol="0" anchor="t">
+            <a:noAutofit/>
+          </a:bodyPr>
+          <a:lstStyle/>
+          <a:p>
+            <a:pPr>
+              <a:defRPr sz="1400"/>
+            </a:pPr>
+            <a:br>
+              <a:rPr lang="en-GB" dirty="0"/>
+            </a:br>
+            <a:endParaRPr lang="en-GB" dirty="0"/>
+          </a:p>
+        </p:txBody>
+      </p:sp>
+      <p:sp>
+        <p:nvSpPr>
+          <p:cNvPr id="4" name="Content Placeholder 2">
+            <a:extLst>
+              <a:ext uri="{FF2B5EF4-FFF2-40B4-BE49-F238E27FC236}">
+                <a16:creationId xmlns:a16="http://schemas.microsoft.com/office/drawing/2014/main" id="{A24256B7-ED38-2607-5E2B-FCD2EC49F806}"/>
+              </a:ext>
+            </a:extLst>
+          </p:cNvPr>
+          <p:cNvSpPr txBox="1">
+            <a:spLocks/>
+          </p:cNvSpPr>
+          <p:nvPr/>
+        </p:nvSpPr>
+        <p:spPr>
+          <a:xfrm>
+            <a:off x="380999" y="1339342"/>
+            <a:ext cx="10977716" cy="4876800"/>
+          </a:xfrm>
+          <a:prstGeom prst="rect">
+            <a:avLst/>
+          </a:prstGeom>
+        </p:spPr>
+        <p:txBody>
+          <a:bodyPr/>
+          <a:lstStyle>
+            <a:lvl1pPr marL="0" indent="0" algn="l" defTabSz="228600" rtl="0" eaLnBrk="1" latinLnBrk="0" hangingPunct="1">
+              <a:lnSpc>
+                <a:spcPct val="100000"/>
+              </a:lnSpc>
+              <a:spcBef>
+                <a:spcPts val="0"/>
+              </a:spcBef>
+              <a:spcAft>
+                <a:spcPts val="1200"/>
+              </a:spcAft>
+              <a:buFont typeface="Arial" panose="020B0604020202020204" pitchFamily="34" charset="0"/>
+              <a:buNone/>
+              <a:defRPr sz="2000" b="0" kern="1200">
+                <a:solidFill>
+                  <a:schemeClr val="tx1"/>
+                </a:solidFill>
+                <a:latin typeface="+mn-lt"/>
+                <a:ea typeface="+mn-ea"/>
+                <a:cs typeface="+mn-cs"/>
+              </a:defRPr>
+            </a:lvl1pPr>
+            <a:lvl2pPr marL="228600" indent="-228600" algn="l" defTabSz="228600" rtl="0" eaLnBrk="1" latinLnBrk="0" hangingPunct="1">
+              <a:lnSpc>
+                <a:spcPct val="100000"/>
+              </a:lnSpc>
+              <a:spcBef>
+                <a:spcPts val="0"/>
+              </a:spcBef>
+              <a:spcAft>
+                <a:spcPts val="1200"/>
+              </a:spcAft>
+              <a:buClrTx/>
+              <a:buFont typeface="Arial" panose="020B0604020202020204" pitchFamily="34" charset="0"/>
+              <a:buChar char="•"/>
+              <a:defRPr sz="2000" kern="1200">
+                <a:solidFill>
+                  <a:schemeClr val="tx1"/>
+                </a:solidFill>
+                <a:latin typeface="+mn-lt"/>
+                <a:ea typeface="+mn-ea"/>
+                <a:cs typeface="+mn-cs"/>
+              </a:defRPr>
+            </a:lvl2pPr>
+            <a:lvl3pPr marL="457200" indent="-228600" algn="l" defTabSz="228600" rtl="0" eaLnBrk="1" latinLnBrk="0" hangingPunct="1">
+              <a:lnSpc>
+                <a:spcPct val="100000"/>
+              </a:lnSpc>
+              <a:spcBef>
+                <a:spcPts val="0"/>
+              </a:spcBef>
+              <a:spcAft>
+                <a:spcPts val="1200"/>
+              </a:spcAft>
+              <a:buFont typeface="System Font"/>
+              <a:buChar char="–"/>
+              <a:defRPr sz="2000" kern="1200">
+                <a:solidFill>
+                  <a:schemeClr val="tx1"/>
+                </a:solidFill>
+                <a:latin typeface="+mn-lt"/>
+                <a:ea typeface="+mn-ea"/>
+                <a:cs typeface="+mn-cs"/>
+              </a:defRPr>
+            </a:lvl3pPr>
+            <a:lvl4pPr marL="685800" indent="-228600" algn="l" defTabSz="228600" rtl="0" eaLnBrk="1" latinLnBrk="0" hangingPunct="1">
+              <a:lnSpc>
+                <a:spcPct val="100000"/>
+              </a:lnSpc>
+              <a:spcBef>
+                <a:spcPts val="0"/>
+              </a:spcBef>
+              <a:spcAft>
+                <a:spcPts val="1200"/>
+              </a:spcAft>
+              <a:buFont typeface="Arial" panose="020B0604020202020204" pitchFamily="34" charset="0"/>
+              <a:buChar char="•"/>
+              <a:defRPr sz="1800" kern="1200">
+                <a:solidFill>
+                  <a:schemeClr val="tx1"/>
+                </a:solidFill>
+                <a:latin typeface="+mn-lt"/>
+                <a:ea typeface="+mn-ea"/>
+                <a:cs typeface="+mn-cs"/>
+              </a:defRPr>
+            </a:lvl4pPr>
+            <a:lvl5pPr marL="914400" indent="-228600" algn="l" defTabSz="228600" rtl="0" eaLnBrk="1" latinLnBrk="0" hangingPunct="1">
+              <a:lnSpc>
+                <a:spcPct val="100000"/>
+              </a:lnSpc>
+              <a:spcBef>
+                <a:spcPts val="0"/>
+              </a:spcBef>
+              <a:spcAft>
+                <a:spcPts val="1200"/>
+              </a:spcAft>
+              <a:buFont typeface="System Font"/>
+              <a:buChar char="–"/>
+              <a:defRPr sz="1800" kern="1200">
+                <a:solidFill>
+                  <a:schemeClr val="tx1"/>
+                </a:solidFill>
+                <a:latin typeface="+mn-lt"/>
+                <a:ea typeface="+mn-ea"/>
+                <a:cs typeface="+mn-cs"/>
+              </a:defRPr>
+            </a:lvl5pPr>
+            <a:lvl6pPr marL="11113" indent="0" algn="l" defTabSz="228600" rtl="0" eaLnBrk="1" latinLnBrk="0" hangingPunct="1">
+              <a:lnSpc>
+                <a:spcPct val="90000"/>
+              </a:lnSpc>
+              <a:spcBef>
+                <a:spcPts val="0"/>
+              </a:spcBef>
+              <a:spcAft>
+                <a:spcPts val="1200"/>
+              </a:spcAft>
+              <a:buFont typeface="Graphik" panose="020B0503030202060203" pitchFamily="34" charset="0"/>
+              <a:buNone/>
+              <a:tabLst/>
+              <a:defRPr sz="1600" kern="1200">
+                <a:solidFill>
+                  <a:schemeClr val="tx1"/>
+                </a:solidFill>
+                <a:latin typeface="+mn-lt"/>
+                <a:ea typeface="+mn-ea"/>
+                <a:cs typeface="+mn-cs"/>
+              </a:defRPr>
+            </a:lvl6pPr>
+            <a:lvl7pPr marL="0" indent="0" algn="l" defTabSz="228600" rtl="0" eaLnBrk="1" latinLnBrk="0" hangingPunct="1">
+              <a:lnSpc>
+                <a:spcPct val="90000"/>
+              </a:lnSpc>
+              <a:spcBef>
+                <a:spcPts val="0"/>
+              </a:spcBef>
+              <a:spcAft>
+                <a:spcPts val="1200"/>
+              </a:spcAft>
+              <a:buFont typeface="Arial" panose="020B0604020202020204" pitchFamily="34" charset="0"/>
+              <a:buNone/>
+              <a:defRPr sz="1200" kern="1200">
+                <a:solidFill>
+                  <a:schemeClr val="tx1"/>
+                </a:solidFill>
+                <a:latin typeface="+mn-lt"/>
+                <a:ea typeface="+mn-ea"/>
+                <a:cs typeface="+mn-cs"/>
+              </a:defRPr>
+            </a:lvl7pPr>
+            <a:lvl8pPr marL="0" indent="0" algn="l" defTabSz="228600" rtl="0" eaLnBrk="1" latinLnBrk="0" hangingPunct="1">
+              <a:lnSpc>
+                <a:spcPct val="90000"/>
+              </a:lnSpc>
+              <a:spcBef>
+                <a:spcPts val="0"/>
+              </a:spcBef>
+              <a:spcAft>
+                <a:spcPts val="1200"/>
+              </a:spcAft>
+              <a:buFont typeface="Arial" panose="020B0604020202020204" pitchFamily="34" charset="0"/>
+              <a:buNone/>
+              <a:defRPr sz="1000" b="1" kern="1200">
+                <a:solidFill>
+                  <a:schemeClr val="tx1"/>
+                </a:solidFill>
+                <a:latin typeface="+mn-lt"/>
+                <a:ea typeface="+mn-ea"/>
+                <a:cs typeface="+mn-cs"/>
+              </a:defRPr>
+            </a:lvl8pPr>
+            <a:lvl9pPr marL="0" indent="0" algn="l" defTabSz="228600" rtl="0" eaLnBrk="1" latinLnBrk="0" hangingPunct="1">
+              <a:lnSpc>
+                <a:spcPct val="90000"/>
+              </a:lnSpc>
+              <a:spcBef>
+                <a:spcPts val="0"/>
+              </a:spcBef>
+              <a:spcAft>
+                <a:spcPts val="1200"/>
+              </a:spcAft>
+              <a:buFont typeface="Arial" panose="020B0604020202020204" pitchFamily="34" charset="0"/>
+              <a:buNone/>
+              <a:defRPr sz="800" kern="1200">
+                <a:solidFill>
+                  <a:schemeClr val="tx2"/>
+                </a:solidFill>
+                <a:latin typeface="+mn-lt"/>
+                <a:ea typeface="+mn-ea"/>
+                <a:cs typeface="+mn-cs"/>
+              </a:defRPr>
+            </a:lvl9pPr>
+          </a:lstStyle>
+          <a:p>
+            <a:pPr>
+              <a:defRPr sz="1400"/>
+            </a:pPr>
+            <a:endParaRPr lang="en-GB" sz="1400" dirty="0"/>
+          </a:p>
+        </p:txBody>
+      </p:sp>
+      <p:pic>
+        <p:nvPicPr>
+          <p:cNvPr id="6" name="Picture 5">
+            <a:extLst>
+              <a:ext uri="{FF2B5EF4-FFF2-40B4-BE49-F238E27FC236}">
+                <a16:creationId xmlns:a16="http://schemas.microsoft.com/office/drawing/2014/main" id="{30A5FAB3-8741-A329-0F85-D26786E35557}"/>
+              </a:ext>
+            </a:extLst>
+          </p:cNvPr>
+          <p:cNvPicPr>
+            <a:picLocks noChangeAspect="1"/>
+          </p:cNvPicPr>
+          <p:nvPr/>
+        </p:nvPicPr>
+        <p:blipFill>
+          <a:blip r:embed="rId3"/>
+          <a:stretch>
+            <a:fillRect/>
+          </a:stretch>
+        </p:blipFill>
+        <p:spPr>
+          <a:xfrm>
+            <a:off x="759950" y="1295018"/>
+            <a:ext cx="4490476" cy="5181982"/>
+          </a:xfrm>
+          <a:prstGeom prst="rect">
+            <a:avLst/>
+          </a:prstGeom>
+        </p:spPr>
+      </p:pic>
+    </p:spTree>
+    <p:extLst>
+      <p:ext uri="{BB962C8B-B14F-4D97-AF65-F5344CB8AC3E}">
+        <p14:creationId xmlns:p14="http://schemas.microsoft.com/office/powerpoint/2010/main" val="1839389817"/>
+      </p:ext>
+    </p:extLst>
+  </p:cSld>
+  <p:clrMapOvr>
+    <a:masterClrMapping/>
+  </p:clrMapOvr>
+  <mc:AlternateContent xmlns:mc="http://schemas.openxmlformats.org/markup-compatibility/2006">
+    <mc:Choice xmlns:p14="http://schemas.microsoft.com/office/powerpoint/2010/main" Requires="p14">
+      <p:transition spd="med" p14:dur="700">
+        <p:fade/>
+      </p:transition>
+    </mc:Choice>
+    <mc:Fallback>
       <p:transition spd="med">
         <p:fade/>
       </p:transition>

</xml_diff>